<commit_message>
initial changing of the deck
</commit_message>
<xml_diff>
--- a/RealtimeCommunicationsWithSignalR.pptx
+++ b/RealtimeCommunicationsWithSignalR.pptx
@@ -14281,7 +14281,7 @@
           <a:graphicData uri="http://schemas.openxmlformats.org/presentationml/2006/ole">
             <mc:AlternateContent xmlns:mc="http://schemas.openxmlformats.org/markup-compatibility/2006">
               <mc:Choice xmlns:v="urn:schemas-microsoft-com:vml" Requires="v">
-                <p:oleObj spid="_x0000_s59495" name="think-cell Slide" r:id="rId4" imgW="270" imgH="270" progId="TCLayout.ActiveDocument.1">
+                <p:oleObj spid="_x0000_s59496" name="think-cell Slide" r:id="rId4" imgW="270" imgH="270" progId="TCLayout.ActiveDocument.1">
                   <p:embed/>
                 </p:oleObj>
               </mc:Choice>
@@ -14453,7 +14453,7 @@
           <a:graphicData uri="http://schemas.openxmlformats.org/presentationml/2006/ole">
             <mc:AlternateContent xmlns:mc="http://schemas.openxmlformats.org/markup-compatibility/2006">
               <mc:Choice xmlns:v="urn:schemas-microsoft-com:vml" Requires="v">
-                <p:oleObj spid="_x0000_s23660" name="think-cell Slide" r:id="rId6" imgW="270" imgH="270" progId="TCLayout.ActiveDocument.1">
+                <p:oleObj spid="_x0000_s23661" name="think-cell Slide" r:id="rId6" imgW="270" imgH="270" progId="TCLayout.ActiveDocument.1">
                   <p:embed/>
                 </p:oleObj>
               </mc:Choice>
@@ -15258,7 +15258,7 @@
                             </p:stCondLst>
                             <p:childTnLst>
                               <p:par>
-                                <p:cTn id="5" presetID="10" presetClass="entr" presetSubtype="0" fill="hold" grpId="0" nodeType="clickEffect">
+                                <p:cTn id="5" presetID="2" presetClass="entr" presetSubtype="1" fill="hold" grpId="0" nodeType="clickEffect">
                                   <p:stCondLst>
                                     <p:cond delay="0"/>
                                   </p:stCondLst>
@@ -15281,26 +15281,64 @@
                                         <p:strVal val="visible"/>
                                       </p:to>
                                     </p:set>
-                                    <p:animEffect transition="in" filter="fade">
-                                      <p:cBhvr>
-                                        <p:cTn id="7" dur="500"/>
+                                    <p:anim calcmode="lin" valueType="num">
+                                      <p:cBhvr additive="base">
+                                        <p:cTn id="7" dur="500" fill="hold"/>
                                         <p:tgtEl>
                                           <p:spTgt spid="9"/>
                                         </p:tgtEl>
+                                        <p:attrNameLst>
+                                          <p:attrName>ppt_x</p:attrName>
+                                        </p:attrNameLst>
                                       </p:cBhvr>
-                                    </p:animEffect>
+                                      <p:tavLst>
+                                        <p:tav tm="0">
+                                          <p:val>
+                                            <p:strVal val="#ppt_x"/>
+                                          </p:val>
+                                        </p:tav>
+                                        <p:tav tm="100000">
+                                          <p:val>
+                                            <p:strVal val="#ppt_x"/>
+                                          </p:val>
+                                        </p:tav>
+                                      </p:tavLst>
+                                    </p:anim>
+                                    <p:anim calcmode="lin" valueType="num">
+                                      <p:cBhvr additive="base">
+                                        <p:cTn id="8" dur="500" fill="hold"/>
+                                        <p:tgtEl>
+                                          <p:spTgt spid="9"/>
+                                        </p:tgtEl>
+                                        <p:attrNameLst>
+                                          <p:attrName>ppt_y</p:attrName>
+                                        </p:attrNameLst>
+                                      </p:cBhvr>
+                                      <p:tavLst>
+                                        <p:tav tm="0">
+                                          <p:val>
+                                            <p:strVal val="0-#ppt_h/2"/>
+                                          </p:val>
+                                        </p:tav>
+                                        <p:tav tm="100000">
+                                          <p:val>
+                                            <p:strVal val="#ppt_y"/>
+                                          </p:val>
+                                        </p:tav>
+                                      </p:tavLst>
+                                    </p:anim>
                                   </p:childTnLst>
                                 </p:cTn>
                               </p:par>
                               <p:par>
-                                <p:cTn id="8" presetID="9" presetClass="emph" presetSubtype="0" grpId="0" nodeType="withEffect">
+                                <p:cTn id="9" presetID="9" presetClass="emph" presetSubtype="0" grpId="0" nodeType="withEffect">
                                   <p:stCondLst>
                                     <p:cond delay="0"/>
                                   </p:stCondLst>
                                   <p:childTnLst>
                                     <p:set>
                                       <p:cBhvr rctx="PPT">
-                                        <p:cTn id="9" dur="indefinite"/>
+                                        <p:cTn id="10" dur="indefinite"/>
                                         <p:tgtEl>
                                           <p:spTgt spid="7">
                                             <p:txEl>
@@ -15318,7 +15356,7 @@
                                     </p:set>
                                     <p:animEffect filter="image" prLst="opacity: 0.25">
                                       <p:cBhvr rctx="IE">
-                                        <p:cTn id="10" dur="indefinite"/>
+                                        <p:cTn id="11" dur="indefinite"/>
                                         <p:tgtEl>
                                           <p:spTgt spid="7">
                                             <p:txEl>
@@ -15338,26 +15376,26 @@
                     </p:cTn>
                   </p:par>
                   <p:par>
-                    <p:cTn id="11" fill="hold">
+                    <p:cTn id="12" fill="hold">
                       <p:stCondLst>
                         <p:cond delay="indefinite"/>
                       </p:stCondLst>
                       <p:childTnLst>
                         <p:par>
-                          <p:cTn id="12" fill="hold">
+                          <p:cTn id="13" fill="hold">
                             <p:stCondLst>
                               <p:cond delay="0"/>
                             </p:stCondLst>
                             <p:childTnLst>
                               <p:par>
-                                <p:cTn id="13" presetID="10" presetClass="entr" presetSubtype="0" fill="hold" grpId="0" nodeType="clickEffect">
+                                <p:cTn id="14" presetID="2" presetClass="entr" presetSubtype="1" fill="hold" grpId="0" nodeType="clickEffect">
                                   <p:stCondLst>
                                     <p:cond delay="0"/>
                                   </p:stCondLst>
                                   <p:childTnLst>
                                     <p:set>
                                       <p:cBhvr>
-                                        <p:cTn id="14" dur="1" fill="hold">
+                                        <p:cTn id="15" dur="1" fill="hold">
                                           <p:stCondLst>
                                             <p:cond delay="0"/>
                                           </p:stCondLst>
@@ -15373,45 +15411,52 @@
                                         <p:strVal val="visible"/>
                                       </p:to>
                                     </p:set>
-                                    <p:animEffect transition="in" filter="fade">
-                                      <p:cBhvr>
-                                        <p:cTn id="15" dur="500"/>
+                                    <p:anim calcmode="lin" valueType="num">
+                                      <p:cBhvr additive="base">
+                                        <p:cTn id="16" dur="500" fill="hold"/>
                                         <p:tgtEl>
                                           <p:spTgt spid="8"/>
                                         </p:tgtEl>
+                                        <p:attrNameLst>
+                                          <p:attrName>ppt_x</p:attrName>
+                                        </p:attrNameLst>
                                       </p:cBhvr>
-                                    </p:animEffect>
-                                  </p:childTnLst>
-                                </p:cTn>
-                              </p:par>
-                              <p:par>
-                                <p:cTn id="16" presetID="9" presetClass="emph" presetSubtype="0" grpId="1" nodeType="withEffect">
-                                  <p:stCondLst>
-                                    <p:cond delay="0"/>
-                                  </p:stCondLst>
-                                  <p:childTnLst>
-                                    <p:set>
-                                      <p:cBhvr rctx="PPT">
-                                        <p:cTn id="17" dur="indefinite"/>
+                                      <p:tavLst>
+                                        <p:tav tm="0">
+                                          <p:val>
+                                            <p:strVal val="#ppt_x"/>
+                                          </p:val>
+                                        </p:tav>
+                                        <p:tav tm="100000">
+                                          <p:val>
+                                            <p:strVal val="#ppt_x"/>
+                                          </p:val>
+                                        </p:tav>
+                                      </p:tavLst>
+                                    </p:anim>
+                                    <p:anim calcmode="lin" valueType="num">
+                                      <p:cBhvr additive="base">
+                                        <p:cTn id="17" dur="500" fill="hold"/>
                                         <p:tgtEl>
-                                          <p:spTgt spid="9"/>
+                                          <p:spTgt spid="8"/>
                                         </p:tgtEl>
                                         <p:attrNameLst>
-                                          <p:attrName>style.opacity</p:attrName>
+                                          <p:attrName>ppt_y</p:attrName>
                                         </p:attrNameLst>
                                       </p:cBhvr>
-                                      <p:to>
-                                        <p:strVal val="0.25"/>
-                                      </p:to>
-                                    </p:set>
-                                    <p:animEffect filter="image" prLst="opacity: 0.25">
-                                      <p:cBhvr rctx="IE">
-                                        <p:cTn id="18" dur="indefinite"/>
-                                        <p:tgtEl>
-                                          <p:spTgt spid="9"/>
-                                        </p:tgtEl>
-                                      </p:cBhvr>
-                                    </p:animEffect>
+                                      <p:tavLst>
+                                        <p:tav tm="0">
+                                          <p:val>
+                                            <p:strVal val="0-#ppt_h/2"/>
+                                          </p:val>
+                                        </p:tav>
+                                        <p:tav tm="100000">
+                                          <p:val>
+                                            <p:strVal val="#ppt_y"/>
+                                          </p:val>
+                                        </p:tav>
+                                      </p:tavLst>
+                                    </p:anim>
                                   </p:childTnLst>
                                 </p:cTn>
                               </p:par>
@@ -15446,7 +15491,6 @@
       <p:bldP spid="7" grpId="0" build="p"/>
       <p:bldP spid="8" grpId="0"/>
       <p:bldP spid="9" grpId="0"/>
-      <p:bldP spid="9" grpId="1"/>
     </p:bldLst>
   </p:timing>
 </p:sld>
@@ -15670,19 +15714,6 @@
               </a:rPr>
               <a:t>Client Browser</a:t>
             </a:r>
-            <a:endParaRPr lang="en-US" sz="2200" dirty="0" smtClean="0">
-              <a:gradFill>
-                <a:gsLst>
-                  <a:gs pos="0">
-                    <a:srgbClr val="FFFFFF"/>
-                  </a:gs>
-                  <a:gs pos="100000">
-                    <a:srgbClr val="FFFFFF"/>
-                  </a:gs>
-                </a:gsLst>
-                <a:lin ang="5400000" scaled="0"/>
-              </a:gradFill>
-            </a:endParaRPr>
           </a:p>
         </p:txBody>
       </p:sp>
@@ -15787,19 +15818,6 @@
               </a:rPr>
               <a:t>Server</a:t>
             </a:r>
-            <a:endParaRPr lang="en-US" sz="2200" dirty="0" smtClean="0">
-              <a:gradFill>
-                <a:gsLst>
-                  <a:gs pos="0">
-                    <a:srgbClr val="FFFFFF"/>
-                  </a:gs>
-                  <a:gs pos="100000">
-                    <a:srgbClr val="FFFFFF"/>
-                  </a:gs>
-                </a:gsLst>
-                <a:lin ang="5400000" scaled="0"/>
-              </a:gradFill>
-            </a:endParaRPr>
           </a:p>
         </p:txBody>
       </p:sp>
@@ -15875,19 +15893,6 @@
               </a:rPr>
               <a:t>Got Data?</a:t>
             </a:r>
-            <a:endParaRPr lang="en-US" sz="2200" dirty="0" smtClean="0">
-              <a:gradFill>
-                <a:gsLst>
-                  <a:gs pos="0">
-                    <a:srgbClr val="FFFFFF"/>
-                  </a:gs>
-                  <a:gs pos="100000">
-                    <a:srgbClr val="FFFFFF"/>
-                  </a:gs>
-                </a:gsLst>
-                <a:lin ang="5400000" scaled="0"/>
-              </a:gradFill>
-            </a:endParaRPr>
           </a:p>
         </p:txBody>
       </p:sp>
@@ -15963,19 +15968,6 @@
               </a:rPr>
               <a:t>Got Data?</a:t>
             </a:r>
-            <a:endParaRPr lang="en-US" sz="2200" dirty="0" smtClean="0">
-              <a:gradFill>
-                <a:gsLst>
-                  <a:gs pos="0">
-                    <a:srgbClr val="FFFFFF"/>
-                  </a:gs>
-                  <a:gs pos="100000">
-                    <a:srgbClr val="FFFFFF"/>
-                  </a:gs>
-                </a:gsLst>
-                <a:lin ang="5400000" scaled="0"/>
-              </a:gradFill>
-            </a:endParaRPr>
           </a:p>
         </p:txBody>
       </p:sp>
@@ -16051,19 +16043,6 @@
               </a:rPr>
               <a:t>Got Data?</a:t>
             </a:r>
-            <a:endParaRPr lang="en-US" sz="2200" dirty="0" smtClean="0">
-              <a:gradFill>
-                <a:gsLst>
-                  <a:gs pos="0">
-                    <a:srgbClr val="FFFFFF"/>
-                  </a:gs>
-                  <a:gs pos="100000">
-                    <a:srgbClr val="FFFFFF"/>
-                  </a:gs>
-                </a:gsLst>
-                <a:lin ang="5400000" scaled="0"/>
-              </a:gradFill>
-            </a:endParaRPr>
           </a:p>
         </p:txBody>
       </p:sp>
@@ -16139,19 +16118,6 @@
               </a:rPr>
               <a:t>Got Data?</a:t>
             </a:r>
-            <a:endParaRPr lang="en-US" sz="2200" dirty="0" smtClean="0">
-              <a:gradFill>
-                <a:gsLst>
-                  <a:gs pos="0">
-                    <a:srgbClr val="FFFFFF"/>
-                  </a:gs>
-                  <a:gs pos="100000">
-                    <a:srgbClr val="FFFFFF"/>
-                  </a:gs>
-                </a:gsLst>
-                <a:lin ang="5400000" scaled="0"/>
-              </a:gradFill>
-            </a:endParaRPr>
           </a:p>
         </p:txBody>
       </p:sp>
@@ -16227,19 +16193,6 @@
               </a:rPr>
               <a:t>Here’s some data!</a:t>
             </a:r>
-            <a:endParaRPr lang="en-US" sz="2200" dirty="0" smtClean="0">
-              <a:gradFill>
-                <a:gsLst>
-                  <a:gs pos="0">
-                    <a:srgbClr val="FFFFFF"/>
-                  </a:gs>
-                  <a:gs pos="100000">
-                    <a:srgbClr val="FFFFFF"/>
-                  </a:gs>
-                </a:gsLst>
-                <a:lin ang="5400000" scaled="0"/>
-              </a:gradFill>
-            </a:endParaRPr>
           </a:p>
         </p:txBody>
       </p:sp>
@@ -16315,19 +16268,6 @@
               </a:rPr>
               <a:t>Got Data?</a:t>
             </a:r>
-            <a:endParaRPr lang="en-US" sz="2200" dirty="0" smtClean="0">
-              <a:gradFill>
-                <a:gsLst>
-                  <a:gs pos="0">
-                    <a:srgbClr val="FFFFFF"/>
-                  </a:gs>
-                  <a:gs pos="100000">
-                    <a:srgbClr val="FFFFFF"/>
-                  </a:gs>
-                </a:gsLst>
-                <a:lin ang="5400000" scaled="0"/>
-              </a:gradFill>
-            </a:endParaRPr>
           </a:p>
         </p:txBody>
       </p:sp>
@@ -16403,19 +16343,6 @@
               </a:rPr>
               <a:t>Got Data?</a:t>
             </a:r>
-            <a:endParaRPr lang="en-US" sz="2200" dirty="0" smtClean="0">
-              <a:gradFill>
-                <a:gsLst>
-                  <a:gs pos="0">
-                    <a:srgbClr val="FFFFFF"/>
-                  </a:gs>
-                  <a:gs pos="100000">
-                    <a:srgbClr val="FFFFFF"/>
-                  </a:gs>
-                </a:gsLst>
-                <a:lin ang="5400000" scaled="0"/>
-              </a:gradFill>
-            </a:endParaRPr>
           </a:p>
         </p:txBody>
       </p:sp>
@@ -16491,19 +16418,6 @@
               </a:rPr>
               <a:t>Got Data?</a:t>
             </a:r>
-            <a:endParaRPr lang="en-US" sz="2200" dirty="0" smtClean="0">
-              <a:gradFill>
-                <a:gsLst>
-                  <a:gs pos="0">
-                    <a:srgbClr val="FFFFFF"/>
-                  </a:gs>
-                  <a:gs pos="100000">
-                    <a:srgbClr val="FFFFFF"/>
-                  </a:gs>
-                </a:gsLst>
-                <a:lin ang="5400000" scaled="0"/>
-              </a:gradFill>
-            </a:endParaRPr>
           </a:p>
         </p:txBody>
       </p:sp>
@@ -16579,19 +16493,6 @@
               </a:rPr>
               <a:t>Got Data?</a:t>
             </a:r>
-            <a:endParaRPr lang="en-US" sz="2200" dirty="0" smtClean="0">
-              <a:gradFill>
-                <a:gsLst>
-                  <a:gs pos="0">
-                    <a:srgbClr val="FFFFFF"/>
-                  </a:gs>
-                  <a:gs pos="100000">
-                    <a:srgbClr val="FFFFFF"/>
-                  </a:gs>
-                </a:gsLst>
-                <a:lin ang="5400000" scaled="0"/>
-              </a:gradFill>
-            </a:endParaRPr>
           </a:p>
         </p:txBody>
       </p:sp>
@@ -30496,7 +30397,7 @@
           <a:graphicData uri="http://schemas.openxmlformats.org/presentationml/2006/ole">
             <mc:AlternateContent xmlns:mc="http://schemas.openxmlformats.org/markup-compatibility/2006">
               <mc:Choice xmlns:v="urn:schemas-microsoft-com:vml" Requires="v">
-                <p:oleObj spid="_x0000_s58475" name="think-cell Slide" r:id="rId4" imgW="270" imgH="270" progId="TCLayout.ActiveDocument.1">
+                <p:oleObj spid="_x0000_s58476" name="think-cell Slide" r:id="rId4" imgW="270" imgH="270" progId="TCLayout.ActiveDocument.1">
                   <p:embed/>
                 </p:oleObj>
               </mc:Choice>
@@ -31814,6 +31715,17 @@
 </file>
 
 <file path=customXml/item2.xml><?xml version="1.0" encoding="utf-8"?>
+<p:properties xmlns:p="http://schemas.microsoft.com/office/2006/metadata/properties" xmlns:xsi="http://www.w3.org/2001/XMLSchema-instance" xmlns:pc="http://schemas.microsoft.com/office/infopath/2007/PartnerControls">
+  <documentManagement>
+    <TaxKeywordTaxHTField xmlns="230e9df3-be65-4c73-a93b-d1236ebd677e">
+      <Terms xmlns="http://schemas.microsoft.com/office/infopath/2007/PartnerControls"/>
+    </TaxKeywordTaxHTField>
+    <TaxCatchAll xmlns="230e9df3-be65-4c73-a93b-d1236ebd677e"/>
+  </documentManagement>
+</p:properties>
+</file>
+
+<file path=customXml/item3.xml><?xml version="1.0" encoding="utf-8"?>
 <ct:contentTypeSchema xmlns:ct="http://schemas.microsoft.com/office/2006/metadata/contentType" xmlns:ma="http://schemas.microsoft.com/office/2006/metadata/properties/metaAttributes" ct:_="" ma:_="" ma:contentTypeName="Document" ma:contentTypeID="0x010100CA05B43BE68FE54B90DD26FDFB72BB05" ma:contentTypeVersion="0" ma:contentTypeDescription="Create a new document." ma:contentTypeScope="" ma:versionID="6df1bece345c1749bd9b91e82fa4a03a">
   <xsd:schema xmlns:xsd="http://www.w3.org/2001/XMLSchema" xmlns:xs="http://www.w3.org/2001/XMLSchema" xmlns:p="http://schemas.microsoft.com/office/2006/metadata/properties" xmlns:ns2="230e9df3-be65-4c73-a93b-d1236ebd677e" targetNamespace="http://schemas.microsoft.com/office/2006/metadata/properties" ma:root="true" ma:fieldsID="e317b0b832c9845d3aae3abd1bb0954e" ns2:_="">
     <xsd:import namespace="230e9df3-be65-4c73-a93b-d1236ebd677e"/>
@@ -31965,17 +31877,6 @@
 </ct:contentTypeSchema>
 </file>
 
-<file path=customXml/item3.xml><?xml version="1.0" encoding="utf-8"?>
-<p:properties xmlns:p="http://schemas.microsoft.com/office/2006/metadata/properties" xmlns:xsi="http://www.w3.org/2001/XMLSchema-instance" xmlns:pc="http://schemas.microsoft.com/office/infopath/2007/PartnerControls">
-  <documentManagement>
-    <TaxKeywordTaxHTField xmlns="230e9df3-be65-4c73-a93b-d1236ebd677e">
-      <Terms xmlns="http://schemas.microsoft.com/office/infopath/2007/PartnerControls"/>
-    </TaxKeywordTaxHTField>
-    <TaxCatchAll xmlns="230e9df3-be65-4c73-a93b-d1236ebd677e"/>
-  </documentManagement>
-</p:properties>
-</file>
-
 <file path=customXml/itemProps1.xml><?xml version="1.0" encoding="utf-8"?>
 <ds:datastoreItem xmlns:ds="http://schemas.openxmlformats.org/officeDocument/2006/customXml" ds:itemID="{B882D8D6-9D38-4159-A398-AAC3689D3D7C}">
   <ds:schemaRefs>
@@ -31985,6 +31886,22 @@
 </file>
 
 <file path=customXml/itemProps2.xml><?xml version="1.0" encoding="utf-8"?>
+<ds:datastoreItem xmlns:ds="http://schemas.openxmlformats.org/officeDocument/2006/customXml" ds:itemID="{69B2F97D-0457-4986-9734-D03EB073C5EA}">
+  <ds:schemaRefs>
+    <ds:schemaRef ds:uri="http://schemas.microsoft.com/office/infopath/2007/PartnerControls"/>
+    <ds:schemaRef ds:uri="http://purl.org/dc/terms/"/>
+    <ds:schemaRef ds:uri="http://schemas.microsoft.com/office/2006/documentManagement/types"/>
+    <ds:schemaRef ds:uri="http://purl.org/dc/elements/1.1/"/>
+    <ds:schemaRef ds:uri="http://schemas.openxmlformats.org/package/2006/metadata/core-properties"/>
+    <ds:schemaRef ds:uri="230e9df3-be65-4c73-a93b-d1236ebd677e"/>
+    <ds:schemaRef ds:uri="http://schemas.microsoft.com/office/2006/metadata/properties"/>
+    <ds:schemaRef ds:uri="http://www.w3.org/XML/1998/namespace"/>
+    <ds:schemaRef ds:uri="http://purl.org/dc/dcmitype/"/>
+  </ds:schemaRefs>
+</ds:datastoreItem>
+</file>
+
+<file path=customXml/itemProps3.xml><?xml version="1.0" encoding="utf-8"?>
 <ds:datastoreItem xmlns:ds="http://schemas.openxmlformats.org/officeDocument/2006/customXml" ds:itemID="{8F590144-748D-417B-8B69-088F107B0F98}">
   <ds:schemaRefs>
     <ds:schemaRef ds:uri="http://schemas.microsoft.com/office/2006/metadata/contentType"/>
@@ -32000,20 +31917,4 @@
     <ds:schemaRef ds:uri="http://schemas.microsoft.com/internal/obd"/>
   </ds:schemaRefs>
 </ds:datastoreItem>
-</file>
-
-<file path=customXml/itemProps3.xml><?xml version="1.0" encoding="utf-8"?>
-<ds:datastoreItem xmlns:ds="http://schemas.openxmlformats.org/officeDocument/2006/customXml" ds:itemID="{69B2F97D-0457-4986-9734-D03EB073C5EA}">
-  <ds:schemaRefs>
-    <ds:schemaRef ds:uri="http://schemas.microsoft.com/office/infopath/2007/PartnerControls"/>
-    <ds:schemaRef ds:uri="http://purl.org/dc/terms/"/>
-    <ds:schemaRef ds:uri="http://schemas.microsoft.com/office/2006/documentManagement/types"/>
-    <ds:schemaRef ds:uri="http://purl.org/dc/elements/1.1/"/>
-    <ds:schemaRef ds:uri="http://schemas.openxmlformats.org/package/2006/metadata/core-properties"/>
-    <ds:schemaRef ds:uri="230e9df3-be65-4c73-a93b-d1236ebd677e"/>
-    <ds:schemaRef ds:uri="http://schemas.microsoft.com/office/2006/metadata/properties"/>
-    <ds:schemaRef ds:uri="http://www.w3.org/XML/1998/namespace"/>
-    <ds:schemaRef ds:uri="http://purl.org/dc/dcmitype/"/>
-  </ds:schemaRefs>
-</ds:datastoreItem>
 </file>
</xml_diff>

<commit_message>
Use same grouping arrow on clients/hosts slide
Changed hosts grouping arrow to match clients and backplane grouping
arrow
</commit_message>
<xml_diff>
--- a/RealtimeCommunicationsWithSignalR.pptx
+++ b/RealtimeCommunicationsWithSignalR.pptx
@@ -276,7 +276,7 @@
               <a:rPr lang="en-US" smtClean="0">
                 <a:latin typeface="Segoe UI" pitchFamily="34" charset="0"/>
               </a:rPr>
-              <a:t>11/20/2012</a:t>
+              <a:t>11/25/2012</a:t>
             </a:fld>
             <a:endParaRPr lang="en-US" dirty="0">
               <a:latin typeface="Segoe UI" pitchFamily="34" charset="0"/>
@@ -458,7 +458,7 @@
             <a:fld id="{CAE3F082-F902-42D8-A765-720E172C3194}" type="datetimeFigureOut">
               <a:rPr lang="en-US" smtClean="0"/>
               <a:pPr/>
-              <a:t>11/20/2012</a:t>
+              <a:t>11/25/2012</a:t>
             </a:fld>
             <a:endParaRPr lang="en-US" dirty="0"/>
           </a:p>
@@ -2481,7 +2481,6 @@
               <a:rPr lang="en-US" b="0" baseline="0" dirty="0" smtClean="0"/>
               <a:t> Hub to show what it does</a:t>
             </a:r>
-            <a:endParaRPr lang="en-US" b="0" baseline="0" dirty="0" smtClean="0"/>
           </a:p>
           <a:p>
             <a:r>
@@ -17531,20 +17530,56 @@
       </p:sp>
       <p:sp>
         <p:nvSpPr>
-          <p:cNvPr id="22" name="Right Brace 21"/>
+          <p:cNvPr id="23" name="TextBox 22"/>
+          <p:cNvSpPr txBox="1"/>
+          <p:nvPr/>
+        </p:nvSpPr>
+        <p:spPr>
+          <a:xfrm>
+            <a:off x="2549688" y="5650140"/>
+            <a:ext cx="926536" cy="387798"/>
+          </a:xfrm>
+          <a:prstGeom prst="rect">
+            <a:avLst/>
+          </a:prstGeom>
+          <a:noFill/>
+        </p:spPr>
+        <p:txBody>
+          <a:bodyPr wrap="none" lIns="0" tIns="0" rIns="0" bIns="0" rtlCol="0">
+            <a:spAutoFit/>
+          </a:bodyPr>
+          <a:lstStyle/>
+          <a:p>
+            <a:pPr>
+              <a:lnSpc>
+                <a:spcPct val="90000"/>
+              </a:lnSpc>
+              <a:spcBef>
+                <a:spcPct val="20000"/>
+              </a:spcBef>
+              <a:buSzPct val="80000"/>
+            </a:pPr>
+            <a:r>
+              <a:rPr lang="en-US" sz="2800" cap="small" dirty="0" smtClean="0"/>
+              <a:t>Hosts</a:t>
+            </a:r>
+            <a:endParaRPr lang="en-US" sz="2800" cap="small" dirty="0"/>
+          </a:p>
+        </p:txBody>
+      </p:sp>
+      <p:sp>
+        <p:nvSpPr>
+          <p:cNvPr id="24" name="Right Brace 23"/>
           <p:cNvSpPr/>
           <p:nvPr/>
         </p:nvSpPr>
         <p:spPr>
           <a:xfrm rot="5400000">
-            <a:off x="2845424" y="3186905"/>
-            <a:ext cx="334185" cy="4553076"/>
+            <a:off x="2835180" y="3178503"/>
+            <a:ext cx="353790" cy="4552193"/>
           </a:xfrm>
           <a:prstGeom prst="rightBrace">
-            <a:avLst>
-              <a:gd name="adj1" fmla="val 0"/>
-              <a:gd name="adj2" fmla="val 50000"/>
-            </a:avLst>
+            <a:avLst/>
           </a:prstGeom>
           <a:ln>
             <a:solidFill>
@@ -17576,45 +17611,6 @@
                 <a:schemeClr val="bg1"/>
               </a:solidFill>
             </a:endParaRPr>
-          </a:p>
-        </p:txBody>
-      </p:sp>
-      <p:sp>
-        <p:nvSpPr>
-          <p:cNvPr id="23" name="TextBox 22"/>
-          <p:cNvSpPr txBox="1"/>
-          <p:nvPr/>
-        </p:nvSpPr>
-        <p:spPr>
-          <a:xfrm>
-            <a:off x="2549688" y="5650140"/>
-            <a:ext cx="926536" cy="387798"/>
-          </a:xfrm>
-          <a:prstGeom prst="rect">
-            <a:avLst/>
-          </a:prstGeom>
-          <a:noFill/>
-        </p:spPr>
-        <p:txBody>
-          <a:bodyPr wrap="none" lIns="0" tIns="0" rIns="0" bIns="0" rtlCol="0">
-            <a:spAutoFit/>
-          </a:bodyPr>
-          <a:lstStyle/>
-          <a:p>
-            <a:pPr>
-              <a:lnSpc>
-                <a:spcPct val="90000"/>
-              </a:lnSpc>
-              <a:spcBef>
-                <a:spcPct val="20000"/>
-              </a:spcBef>
-              <a:buSzPct val="80000"/>
-            </a:pPr>
-            <a:r>
-              <a:rPr lang="en-US" sz="2800" cap="small" dirty="0" smtClean="0"/>
-              <a:t>Hosts</a:t>
-            </a:r>
-            <a:endParaRPr lang="en-US" sz="2800" cap="small" dirty="0"/>
           </a:p>
         </p:txBody>
       </p:sp>
@@ -18294,59 +18290,24 @@
                                   </p:childTnLst>
                                 </p:cTn>
                               </p:par>
+                            </p:childTnLst>
+                          </p:cTn>
+                        </p:par>
+                        <p:par>
+                          <p:cTn id="45" fill="hold">
+                            <p:stCondLst>
+                              <p:cond delay="500"/>
+                            </p:stCondLst>
+                            <p:childTnLst>
                               <p:par>
-                                <p:cTn id="45" presetID="10" presetClass="entr" presetSubtype="0" fill="hold" grpId="0" nodeType="withEffect">
+                                <p:cTn id="46" presetID="2" presetClass="entr" presetSubtype="4" fill="hold" grpId="0" nodeType="afterEffect">
                                   <p:stCondLst>
                                     <p:cond delay="0"/>
                                   </p:stCondLst>
                                   <p:childTnLst>
                                     <p:set>
                                       <p:cBhvr>
-                                        <p:cTn id="46" dur="1" fill="hold">
-                                          <p:stCondLst>
-                                            <p:cond delay="0"/>
-                                          </p:stCondLst>
-                                        </p:cTn>
-                                        <p:tgtEl>
-                                          <p:spTgt spid="22"/>
-                                        </p:tgtEl>
-                                        <p:attrNameLst>
-                                          <p:attrName>style.visibility</p:attrName>
-                                        </p:attrNameLst>
-                                      </p:cBhvr>
-                                      <p:to>
-                                        <p:strVal val="visible"/>
-                                      </p:to>
-                                    </p:set>
-                                    <p:animEffect transition="in" filter="fade">
-                                      <p:cBhvr>
-                                        <p:cTn id="47" dur="500"/>
-                                        <p:tgtEl>
-                                          <p:spTgt spid="22"/>
-                                        </p:tgtEl>
-                                      </p:cBhvr>
-                                    </p:animEffect>
-                                  </p:childTnLst>
-                                </p:cTn>
-                              </p:par>
-                            </p:childTnLst>
-                          </p:cTn>
-                        </p:par>
-                        <p:par>
-                          <p:cTn id="48" fill="hold">
-                            <p:stCondLst>
-                              <p:cond delay="500"/>
-                            </p:stCondLst>
-                            <p:childTnLst>
-                              <p:par>
-                                <p:cTn id="49" presetID="2" presetClass="entr" presetSubtype="4" fill="hold" grpId="0" nodeType="afterEffect">
-                                  <p:stCondLst>
-                                    <p:cond delay="0"/>
-                                  </p:stCondLst>
-                                  <p:childTnLst>
-                                    <p:set>
-                                      <p:cBhvr>
-                                        <p:cTn id="50" dur="1" fill="hold">
+                                        <p:cTn id="47" dur="1" fill="hold">
                                           <p:stCondLst>
                                             <p:cond delay="0"/>
                                           </p:stCondLst>
@@ -18364,7 +18325,7 @@
                                     </p:set>
                                     <p:anim calcmode="lin" valueType="num">
                                       <p:cBhvr additive="base">
-                                        <p:cTn id="51" dur="500" fill="hold"/>
+                                        <p:cTn id="48" dur="500" fill="hold"/>
                                         <p:tgtEl>
                                           <p:spTgt spid="5"/>
                                         </p:tgtEl>
@@ -18387,7 +18348,7 @@
                                     </p:anim>
                                     <p:anim calcmode="lin" valueType="num">
                                       <p:cBhvr additive="base">
-                                        <p:cTn id="52" dur="500" fill="hold"/>
+                                        <p:cTn id="49" dur="500" fill="hold"/>
                                         <p:tgtEl>
                                           <p:spTgt spid="5"/>
                                         </p:tgtEl>
@@ -18412,14 +18373,14 @@
                                 </p:cTn>
                               </p:par>
                               <p:par>
-                                <p:cTn id="53" presetID="2" presetClass="entr" presetSubtype="4" fill="hold" grpId="0" nodeType="withEffect">
+                                <p:cTn id="50" presetID="2" presetClass="entr" presetSubtype="4" fill="hold" grpId="0" nodeType="withEffect">
                                   <p:stCondLst>
                                     <p:cond delay="0"/>
                                   </p:stCondLst>
                                   <p:childTnLst>
                                     <p:set>
                                       <p:cBhvr>
-                                        <p:cTn id="54" dur="1" fill="hold">
+                                        <p:cTn id="51" dur="1" fill="hold">
                                           <p:stCondLst>
                                             <p:cond delay="0"/>
                                           </p:stCondLst>
@@ -18437,7 +18398,7 @@
                                     </p:set>
                                     <p:anim calcmode="lin" valueType="num">
                                       <p:cBhvr additive="base">
-                                        <p:cTn id="55" dur="500" fill="hold"/>
+                                        <p:cTn id="52" dur="500" fill="hold"/>
                                         <p:tgtEl>
                                           <p:spTgt spid="19"/>
                                         </p:tgtEl>
@@ -18460,7 +18421,7 @@
                                     </p:anim>
                                     <p:anim calcmode="lin" valueType="num">
                                       <p:cBhvr additive="base">
-                                        <p:cTn id="56" dur="500" fill="hold"/>
+                                        <p:cTn id="53" dur="500" fill="hold"/>
                                         <p:tgtEl>
                                           <p:spTgt spid="19"/>
                                         </p:tgtEl>
@@ -18485,14 +18446,14 @@
                                 </p:cTn>
                               </p:par>
                               <p:par>
-                                <p:cTn id="57" presetID="2" presetClass="entr" presetSubtype="4" fill="hold" grpId="0" nodeType="withEffect">
+                                <p:cTn id="54" presetID="2" presetClass="entr" presetSubtype="4" fill="hold" grpId="0" nodeType="withEffect">
                                   <p:stCondLst>
                                     <p:cond delay="0"/>
                                   </p:stCondLst>
                                   <p:childTnLst>
                                     <p:set>
                                       <p:cBhvr>
-                                        <p:cTn id="58" dur="1" fill="hold">
+                                        <p:cTn id="55" dur="1" fill="hold">
                                           <p:stCondLst>
                                             <p:cond delay="0"/>
                                           </p:stCondLst>
@@ -18510,7 +18471,7 @@
                                     </p:set>
                                     <p:anim calcmode="lin" valueType="num">
                                       <p:cBhvr additive="base">
-                                        <p:cTn id="59" dur="500" fill="hold"/>
+                                        <p:cTn id="56" dur="500" fill="hold"/>
                                         <p:tgtEl>
                                           <p:spTgt spid="6"/>
                                         </p:tgtEl>
@@ -18533,7 +18494,7 @@
                                     </p:anim>
                                     <p:anim calcmode="lin" valueType="num">
                                       <p:cBhvr additive="base">
-                                        <p:cTn id="60" dur="500" fill="hold"/>
+                                        <p:cTn id="57" dur="500" fill="hold"/>
                                         <p:tgtEl>
                                           <p:spTgt spid="6"/>
                                         </p:tgtEl>
@@ -18564,26 +18525,26 @@
                     </p:cTn>
                   </p:par>
                   <p:par>
-                    <p:cTn id="61" fill="hold">
+                    <p:cTn id="58" fill="hold">
                       <p:stCondLst>
                         <p:cond delay="indefinite"/>
                       </p:stCondLst>
                       <p:childTnLst>
                         <p:par>
-                          <p:cTn id="62" fill="hold">
+                          <p:cTn id="59" fill="hold">
                             <p:stCondLst>
                               <p:cond delay="0"/>
                             </p:stCondLst>
                             <p:childTnLst>
                               <p:par>
-                                <p:cTn id="63" presetID="10" presetClass="entr" presetSubtype="0" fill="hold" grpId="0" nodeType="clickEffect">
+                                <p:cTn id="60" presetID="10" presetClass="entr" presetSubtype="0" fill="hold" grpId="0" nodeType="clickEffect">
                                   <p:stCondLst>
                                     <p:cond delay="0"/>
                                   </p:stCondLst>
                                   <p:childTnLst>
                                     <p:set>
                                       <p:cBhvr>
-                                        <p:cTn id="64" dur="1" fill="hold">
+                                        <p:cTn id="61" dur="1" fill="hold">
                                           <p:stCondLst>
                                             <p:cond delay="0"/>
                                           </p:stCondLst>
@@ -18601,7 +18562,7 @@
                                     </p:set>
                                     <p:animEffect transition="in" filter="fade">
                                       <p:cBhvr>
-                                        <p:cTn id="65" dur="500"/>
+                                        <p:cTn id="62" dur="500"/>
                                         <p:tgtEl>
                                           <p:spTgt spid="18"/>
                                         </p:tgtEl>
@@ -18611,14 +18572,14 @@
                                 </p:cTn>
                               </p:par>
                               <p:par>
-                                <p:cTn id="66" presetID="10" presetClass="entr" presetSubtype="0" fill="hold" grpId="0" nodeType="withEffect">
+                                <p:cTn id="63" presetID="10" presetClass="entr" presetSubtype="0" fill="hold" grpId="0" nodeType="withEffect">
                                   <p:stCondLst>
                                     <p:cond delay="0"/>
                                   </p:stCondLst>
                                   <p:childTnLst>
                                     <p:set>
                                       <p:cBhvr>
-                                        <p:cTn id="67" dur="1" fill="hold">
+                                        <p:cTn id="64" dur="1" fill="hold">
                                           <p:stCondLst>
                                             <p:cond delay="0"/>
                                           </p:stCondLst>
@@ -18636,7 +18597,7 @@
                                     </p:set>
                                     <p:animEffect transition="in" filter="fade">
                                       <p:cBhvr>
-                                        <p:cTn id="68" dur="500"/>
+                                        <p:cTn id="65" dur="500"/>
                                         <p:tgtEl>
                                           <p:spTgt spid="17"/>
                                         </p:tgtEl>
@@ -18649,20 +18610,20 @@
                           </p:cTn>
                         </p:par>
                         <p:par>
-                          <p:cTn id="69" fill="hold">
+                          <p:cTn id="66" fill="hold">
                             <p:stCondLst>
                               <p:cond delay="500"/>
                             </p:stCondLst>
                             <p:childTnLst>
                               <p:par>
-                                <p:cTn id="70" presetID="2" presetClass="entr" presetSubtype="4" fill="hold" grpId="0" nodeType="afterEffect">
+                                <p:cTn id="67" presetID="2" presetClass="entr" presetSubtype="4" fill="hold" grpId="0" nodeType="afterEffect">
                                   <p:stCondLst>
                                     <p:cond delay="0"/>
                                   </p:stCondLst>
                                   <p:childTnLst>
                                     <p:set>
                                       <p:cBhvr>
-                                        <p:cTn id="71" dur="1" fill="hold">
+                                        <p:cTn id="68" dur="1" fill="hold">
                                           <p:stCondLst>
                                             <p:cond delay="0"/>
                                           </p:stCondLst>
@@ -18680,7 +18641,7 @@
                                     </p:set>
                                     <p:anim calcmode="lin" valueType="num">
                                       <p:cBhvr additive="base">
-                                        <p:cTn id="72" dur="500" fill="hold"/>
+                                        <p:cTn id="69" dur="500" fill="hold"/>
                                         <p:tgtEl>
                                           <p:spTgt spid="20"/>
                                         </p:tgtEl>
@@ -18703,7 +18664,7 @@
                                     </p:anim>
                                     <p:anim calcmode="lin" valueType="num">
                                       <p:cBhvr additive="base">
-                                        <p:cTn id="73" dur="500" fill="hold"/>
+                                        <p:cTn id="70" dur="500" fill="hold"/>
                                         <p:tgtEl>
                                           <p:spTgt spid="20"/>
                                         </p:tgtEl>
@@ -18728,14 +18689,14 @@
                                 </p:cTn>
                               </p:par>
                               <p:par>
-                                <p:cTn id="74" presetID="2" presetClass="entr" presetSubtype="4" fill="hold" grpId="0" nodeType="withEffect">
+                                <p:cTn id="71" presetID="2" presetClass="entr" presetSubtype="4" fill="hold" grpId="0" nodeType="withEffect">
                                   <p:stCondLst>
                                     <p:cond delay="0"/>
                                   </p:stCondLst>
                                   <p:childTnLst>
                                     <p:set>
                                       <p:cBhvr>
-                                        <p:cTn id="75" dur="1" fill="hold">
+                                        <p:cTn id="72" dur="1" fill="hold">
                                           <p:stCondLst>
                                             <p:cond delay="0"/>
                                           </p:stCondLst>
@@ -18753,7 +18714,7 @@
                                     </p:set>
                                     <p:anim calcmode="lin" valueType="num">
                                       <p:cBhvr additive="base">
-                                        <p:cTn id="76" dur="500" fill="hold"/>
+                                        <p:cTn id="73" dur="500" fill="hold"/>
                                         <p:tgtEl>
                                           <p:spTgt spid="8"/>
                                         </p:tgtEl>
@@ -18776,7 +18737,7 @@
                                     </p:anim>
                                     <p:anim calcmode="lin" valueType="num">
                                       <p:cBhvr additive="base">
-                                        <p:cTn id="77" dur="500" fill="hold"/>
+                                        <p:cTn id="74" dur="500" fill="hold"/>
                                         <p:tgtEl>
                                           <p:spTgt spid="8"/>
                                         </p:tgtEl>
@@ -18801,14 +18762,14 @@
                                 </p:cTn>
                               </p:par>
                               <p:par>
-                                <p:cTn id="78" presetID="2" presetClass="entr" presetSubtype="4" fill="hold" grpId="0" nodeType="withEffect">
+                                <p:cTn id="75" presetID="2" presetClass="entr" presetSubtype="4" fill="hold" grpId="0" nodeType="withEffect">
                                   <p:stCondLst>
                                     <p:cond delay="0"/>
                                   </p:stCondLst>
                                   <p:childTnLst>
                                     <p:set>
                                       <p:cBhvr>
-                                        <p:cTn id="79" dur="1" fill="hold">
+                                        <p:cTn id="76" dur="1" fill="hold">
                                           <p:stCondLst>
                                             <p:cond delay="0"/>
                                           </p:stCondLst>
@@ -18826,7 +18787,7 @@
                                     </p:set>
                                     <p:anim calcmode="lin" valueType="num">
                                       <p:cBhvr additive="base">
-                                        <p:cTn id="80" dur="500" fill="hold"/>
+                                        <p:cTn id="77" dur="500" fill="hold"/>
                                         <p:tgtEl>
                                           <p:spTgt spid="7"/>
                                         </p:tgtEl>
@@ -18849,7 +18810,7 @@
                                     </p:anim>
                                     <p:anim calcmode="lin" valueType="num">
                                       <p:cBhvr additive="base">
-                                        <p:cTn id="81" dur="500" fill="hold"/>
+                                        <p:cTn id="78" dur="500" fill="hold"/>
                                         <p:tgtEl>
                                           <p:spTgt spid="7"/>
                                         </p:tgtEl>
@@ -18870,6 +18831,41 @@
                                         </p:tav>
                                       </p:tavLst>
                                     </p:anim>
+                                  </p:childTnLst>
+                                </p:cTn>
+                              </p:par>
+                              <p:par>
+                                <p:cTn id="79" presetID="10" presetClass="entr" presetSubtype="0" fill="hold" grpId="0" nodeType="withEffect">
+                                  <p:stCondLst>
+                                    <p:cond delay="0"/>
+                                  </p:stCondLst>
+                                  <p:childTnLst>
+                                    <p:set>
+                                      <p:cBhvr>
+                                        <p:cTn id="80" dur="1" fill="hold">
+                                          <p:stCondLst>
+                                            <p:cond delay="0"/>
+                                          </p:stCondLst>
+                                        </p:cTn>
+                                        <p:tgtEl>
+                                          <p:spTgt spid="24"/>
+                                        </p:tgtEl>
+                                        <p:attrNameLst>
+                                          <p:attrName>style.visibility</p:attrName>
+                                        </p:attrNameLst>
+                                      </p:cBhvr>
+                                      <p:to>
+                                        <p:strVal val="visible"/>
+                                      </p:to>
+                                    </p:set>
+                                    <p:animEffect transition="in" filter="fade">
+                                      <p:cBhvr>
+                                        <p:cTn id="81" dur="500"/>
+                                        <p:tgtEl>
+                                          <p:spTgt spid="24"/>
+                                        </p:tgtEl>
+                                      </p:cBhvr>
+                                    </p:animEffect>
                                   </p:childTnLst>
                                 </p:cTn>
                               </p:par>
@@ -18918,8 +18914,8 @@
       <p:bldP spid="19" grpId="0" animBg="1"/>
       <p:bldP spid="20" grpId="0" animBg="1"/>
       <p:bldP spid="21" grpId="0" animBg="1"/>
-      <p:bldP spid="22" grpId="0" animBg="1"/>
       <p:bldP spid="23" grpId="0"/>
+      <p:bldP spid="24" grpId="0" animBg="1"/>
     </p:bldLst>
   </p:timing>
 </p:sld>
@@ -29416,7 +29412,7 @@
           <a:graphicData uri="http://schemas.openxmlformats.org/presentationml/2006/ole">
             <mc:AlternateContent xmlns:mc="http://schemas.openxmlformats.org/markup-compatibility/2006">
               <mc:Choice xmlns:v="urn:schemas-microsoft-com:vml" Requires="v">
-                <p:oleObj spid="_x0000_s58500" name="think-cell Slide" r:id="rId4" imgW="270" imgH="270" progId="TCLayout.ActiveDocument.1">
+                <p:oleObj spid="_x0000_s58501" name="think-cell Slide" r:id="rId4" imgW="270" imgH="270" progId="TCLayout.ActiveDocument.1">
                   <p:embed/>
                 </p:oleObj>
               </mc:Choice>
@@ -29525,7 +29521,7 @@
           <a:graphicData uri="http://schemas.openxmlformats.org/presentationml/2006/ole">
             <mc:AlternateContent xmlns:mc="http://schemas.openxmlformats.org/markup-compatibility/2006">
               <mc:Choice xmlns:v="urn:schemas-microsoft-com:vml" Requires="v">
-                <p:oleObj spid="_x0000_s59520" name="think-cell Slide" r:id="rId5" imgW="270" imgH="270" progId="TCLayout.ActiveDocument.1">
+                <p:oleObj spid="_x0000_s59521" name="think-cell Slide" r:id="rId5" imgW="270" imgH="270" progId="TCLayout.ActiveDocument.1">
                   <p:embed/>
                 </p:oleObj>
               </mc:Choice>
@@ -29832,7 +29828,7 @@
           <a:graphicData uri="http://schemas.openxmlformats.org/presentationml/2006/ole">
             <mc:AlternateContent xmlns:mc="http://schemas.openxmlformats.org/markup-compatibility/2006">
               <mc:Choice xmlns:v="urn:schemas-microsoft-com:vml" Requires="v">
-                <p:oleObj spid="_x0000_s23685" name="think-cell Slide" r:id="rId7" imgW="270" imgH="270" progId="TCLayout.ActiveDocument.1">
+                <p:oleObj spid="_x0000_s23686" name="think-cell Slide" r:id="rId7" imgW="270" imgH="270" progId="TCLayout.ActiveDocument.1">
                   <p:embed/>
                 </p:oleObj>
               </mc:Choice>
@@ -32996,19 +32992,6 @@
               </a:rPr>
               <a:t>I do real time, do you?</a:t>
             </a:r>
-            <a:endParaRPr lang="en-US" sz="2200" dirty="0" smtClean="0">
-              <a:gradFill>
-                <a:gsLst>
-                  <a:gs pos="0">
-                    <a:srgbClr val="FFFFFF"/>
-                  </a:gs>
-                  <a:gs pos="100000">
-                    <a:srgbClr val="FFFFFF"/>
-                  </a:gs>
-                </a:gsLst>
-                <a:lin ang="5400000" scaled="0"/>
-              </a:gradFill>
-            </a:endParaRPr>
           </a:p>
         </p:txBody>
       </p:sp>
@@ -33084,19 +33067,6 @@
               </a:rPr>
               <a:t>Absolutely!</a:t>
             </a:r>
-            <a:endParaRPr lang="en-US" sz="2200" dirty="0" smtClean="0">
-              <a:gradFill>
-                <a:gsLst>
-                  <a:gs pos="0">
-                    <a:srgbClr val="FFFFFF"/>
-                  </a:gs>
-                  <a:gs pos="100000">
-                    <a:srgbClr val="FFFFFF"/>
-                  </a:gs>
-                </a:gsLst>
-                <a:lin ang="5400000" scaled="0"/>
-              </a:gradFill>
-            </a:endParaRPr>
           </a:p>
         </p:txBody>
       </p:sp>
@@ -33214,19 +33184,6 @@
               </a:rPr>
               <a:t>Let’s Party in Real-time!</a:t>
             </a:r>
-            <a:endParaRPr lang="en-US" sz="2200" dirty="0" smtClean="0">
-              <a:gradFill>
-                <a:gsLst>
-                  <a:gs pos="0">
-                    <a:srgbClr val="FFFFFF"/>
-                  </a:gs>
-                  <a:gs pos="100000">
-                    <a:srgbClr val="FFFFFF"/>
-                  </a:gs>
-                </a:gsLst>
-                <a:lin ang="5400000" scaled="0"/>
-              </a:gradFill>
-            </a:endParaRPr>
           </a:p>
         </p:txBody>
       </p:sp>
@@ -34910,26 +34867,6 @@
 </file>
 
 <file path=customXml/item1.xml><?xml version="1.0" encoding="utf-8"?>
-<?mso-contentType ?>
-<FormTemplates xmlns="http://schemas.microsoft.com/sharepoint/v3/contenttype/forms">
-  <Display>DocumentLibraryForm</Display>
-  <Edit>DocumentLibraryForm</Edit>
-  <New>DocumentLibraryForm</New>
-</FormTemplates>
-</file>
-
-<file path=customXml/item2.xml><?xml version="1.0" encoding="utf-8"?>
-<p:properties xmlns:p="http://schemas.microsoft.com/office/2006/metadata/properties" xmlns:xsi="http://www.w3.org/2001/XMLSchema-instance" xmlns:pc="http://schemas.microsoft.com/office/infopath/2007/PartnerControls">
-  <documentManagement>
-    <TaxKeywordTaxHTField xmlns="230e9df3-be65-4c73-a93b-d1236ebd677e">
-      <Terms xmlns="http://schemas.microsoft.com/office/infopath/2007/PartnerControls"/>
-    </TaxKeywordTaxHTField>
-    <TaxCatchAll xmlns="230e9df3-be65-4c73-a93b-d1236ebd677e"/>
-  </documentManagement>
-</p:properties>
-</file>
-
-<file path=customXml/item3.xml><?xml version="1.0" encoding="utf-8"?>
 <ct:contentTypeSchema xmlns:ct="http://schemas.microsoft.com/office/2006/metadata/contentType" xmlns:ma="http://schemas.microsoft.com/office/2006/metadata/properties/metaAttributes" ct:_="" ma:_="" ma:contentTypeName="Document" ma:contentTypeID="0x010100CA05B43BE68FE54B90DD26FDFB72BB05" ma:contentTypeVersion="0" ma:contentTypeDescription="Create a new document." ma:contentTypeScope="" ma:versionID="6df1bece345c1749bd9b91e82fa4a03a">
   <xsd:schema xmlns:xsd="http://www.w3.org/2001/XMLSchema" xmlns:xs="http://www.w3.org/2001/XMLSchema" xmlns:p="http://schemas.microsoft.com/office/2006/metadata/properties" xmlns:ns2="230e9df3-be65-4c73-a93b-d1236ebd677e" targetNamespace="http://schemas.microsoft.com/office/2006/metadata/properties" ma:root="true" ma:fieldsID="e317b0b832c9845d3aae3abd1bb0954e" ns2:_="">
     <xsd:import namespace="230e9df3-be65-4c73-a93b-d1236ebd677e"/>
@@ -35081,10 +35018,40 @@
 </ct:contentTypeSchema>
 </file>
 
+<file path=customXml/item2.xml><?xml version="1.0" encoding="utf-8"?>
+<p:properties xmlns:p="http://schemas.microsoft.com/office/2006/metadata/properties" xmlns:xsi="http://www.w3.org/2001/XMLSchema-instance" xmlns:pc="http://schemas.microsoft.com/office/infopath/2007/PartnerControls">
+  <documentManagement>
+    <TaxKeywordTaxHTField xmlns="230e9df3-be65-4c73-a93b-d1236ebd677e">
+      <Terms xmlns="http://schemas.microsoft.com/office/infopath/2007/PartnerControls"/>
+    </TaxKeywordTaxHTField>
+    <TaxCatchAll xmlns="230e9df3-be65-4c73-a93b-d1236ebd677e"/>
+  </documentManagement>
+</p:properties>
+</file>
+
+<file path=customXml/item3.xml><?xml version="1.0" encoding="utf-8"?>
+<?mso-contentType ?>
+<FormTemplates xmlns="http://schemas.microsoft.com/sharepoint/v3/contenttype/forms">
+  <Display>DocumentLibraryForm</Display>
+  <Edit>DocumentLibraryForm</Edit>
+  <New>DocumentLibraryForm</New>
+</FormTemplates>
+</file>
+
 <file path=customXml/itemProps1.xml><?xml version="1.0" encoding="utf-8"?>
-<ds:datastoreItem xmlns:ds="http://schemas.openxmlformats.org/officeDocument/2006/customXml" ds:itemID="{B882D8D6-9D38-4159-A398-AAC3689D3D7C}">
+<ds:datastoreItem xmlns:ds="http://schemas.openxmlformats.org/officeDocument/2006/customXml" ds:itemID="{8F590144-748D-417B-8B69-088F107B0F98}">
   <ds:schemaRefs>
-    <ds:schemaRef ds:uri="http://schemas.microsoft.com/sharepoint/v3/contenttype/forms"/>
+    <ds:schemaRef ds:uri="http://schemas.microsoft.com/office/2006/metadata/contentType"/>
+    <ds:schemaRef ds:uri="http://schemas.microsoft.com/office/2006/metadata/properties/metaAttributes"/>
+    <ds:schemaRef ds:uri="http://www.w3.org/2001/XMLSchema"/>
+    <ds:schemaRef ds:uri="http://schemas.microsoft.com/office/2006/metadata/properties"/>
+    <ds:schemaRef ds:uri="230e9df3-be65-4c73-a93b-d1236ebd677e"/>
+    <ds:schemaRef ds:uri="http://schemas.microsoft.com/office/2006/documentManagement/types"/>
+    <ds:schemaRef ds:uri="http://schemas.microsoft.com/office/infopath/2007/PartnerControls"/>
+    <ds:schemaRef ds:uri="http://schemas.openxmlformats.org/package/2006/metadata/core-properties"/>
+    <ds:schemaRef ds:uri="http://purl.org/dc/elements/1.1/"/>
+    <ds:schemaRef ds:uri="http://purl.org/dc/terms/"/>
+    <ds:schemaRef ds:uri="http://schemas.microsoft.com/internal/obd"/>
   </ds:schemaRefs>
 </ds:datastoreItem>
 </file>
@@ -35106,19 +35073,9 @@
 </file>
 
 <file path=customXml/itemProps3.xml><?xml version="1.0" encoding="utf-8"?>
-<ds:datastoreItem xmlns:ds="http://schemas.openxmlformats.org/officeDocument/2006/customXml" ds:itemID="{8F590144-748D-417B-8B69-088F107B0F98}">
+<ds:datastoreItem xmlns:ds="http://schemas.openxmlformats.org/officeDocument/2006/customXml" ds:itemID="{B882D8D6-9D38-4159-A398-AAC3689D3D7C}">
   <ds:schemaRefs>
-    <ds:schemaRef ds:uri="http://schemas.microsoft.com/office/2006/metadata/contentType"/>
-    <ds:schemaRef ds:uri="http://schemas.microsoft.com/office/2006/metadata/properties/metaAttributes"/>
-    <ds:schemaRef ds:uri="http://www.w3.org/2001/XMLSchema"/>
-    <ds:schemaRef ds:uri="http://schemas.microsoft.com/office/2006/metadata/properties"/>
-    <ds:schemaRef ds:uri="230e9df3-be65-4c73-a93b-d1236ebd677e"/>
-    <ds:schemaRef ds:uri="http://schemas.microsoft.com/office/2006/documentManagement/types"/>
-    <ds:schemaRef ds:uri="http://schemas.microsoft.com/office/infopath/2007/PartnerControls"/>
-    <ds:schemaRef ds:uri="http://schemas.openxmlformats.org/package/2006/metadata/core-properties"/>
-    <ds:schemaRef ds:uri="http://purl.org/dc/elements/1.1/"/>
-    <ds:schemaRef ds:uri="http://purl.org/dc/terms/"/>
-    <ds:schemaRef ds:uri="http://schemas.microsoft.com/internal/obd"/>
+    <ds:schemaRef ds:uri="http://schemas.microsoft.com/sharepoint/v3/contenttype/forms"/>
   </ds:schemaRefs>
 </ds:datastoreItem>
 </file>
</xml_diff>

<commit_message>
tweaked the deck a little
</commit_message>
<xml_diff>
--- a/RealtimeCommunicationsWithSignalR.pptx
+++ b/RealtimeCommunicationsWithSignalR.pptx
@@ -6,30 +6,31 @@
     <p:sldMasterId id="2147483779" r:id="rId5"/>
   </p:sldMasterIdLst>
   <p:notesMasterIdLst>
-    <p:notesMasterId r:id="rId19"/>
+    <p:notesMasterId r:id="rId20"/>
   </p:notesMasterIdLst>
   <p:handoutMasterIdLst>
-    <p:handoutMasterId r:id="rId20"/>
+    <p:handoutMasterId r:id="rId21"/>
   </p:handoutMasterIdLst>
   <p:sldIdLst>
     <p:sldId id="296" r:id="rId6"/>
     <p:sldId id="293" r:id="rId7"/>
-    <p:sldId id="298" r:id="rId8"/>
-    <p:sldId id="257" r:id="rId9"/>
-    <p:sldId id="297" r:id="rId10"/>
+    <p:sldId id="257" r:id="rId8"/>
+    <p:sldId id="297" r:id="rId9"/>
+    <p:sldId id="307" r:id="rId10"/>
     <p:sldId id="302" r:id="rId11"/>
     <p:sldId id="300" r:id="rId12"/>
     <p:sldId id="304" r:id="rId13"/>
-    <p:sldId id="303" r:id="rId14"/>
-    <p:sldId id="299" r:id="rId15"/>
-    <p:sldId id="301" r:id="rId16"/>
-    <p:sldId id="305" r:id="rId17"/>
-    <p:sldId id="292" r:id="rId18"/>
+    <p:sldId id="306" r:id="rId14"/>
+    <p:sldId id="303" r:id="rId15"/>
+    <p:sldId id="299" r:id="rId16"/>
+    <p:sldId id="301" r:id="rId17"/>
+    <p:sldId id="305" r:id="rId18"/>
+    <p:sldId id="292" r:id="rId19"/>
   </p:sldIdLst>
   <p:sldSz cx="12188825" cy="6858000"/>
   <p:notesSz cx="6858000" cy="9296400"/>
   <p:custDataLst>
-    <p:tags r:id="rId21"/>
+    <p:tags r:id="rId22"/>
   </p:custDataLst>
   <p:defaultTextStyle>
     <a:defPPr>
@@ -276,7 +277,7 @@
               <a:rPr lang="en-US" smtClean="0">
                 <a:latin typeface="Segoe UI" pitchFamily="34" charset="0"/>
               </a:rPr>
-              <a:t>11/25/2012</a:t>
+              <a:t>11/29/2012</a:t>
             </a:fld>
             <a:endParaRPr lang="en-US" dirty="0">
               <a:latin typeface="Segoe UI" pitchFamily="34" charset="0"/>
@@ -458,7 +459,7 @@
             <a:fld id="{CAE3F082-F902-42D8-A765-720E172C3194}" type="datetimeFigureOut">
               <a:rPr lang="en-US" smtClean="0"/>
               <a:pPr/>
-              <a:t>11/25/2012</a:t>
+              <a:t>11/29/2012</a:t>
             </a:fld>
             <a:endParaRPr lang="en-US" dirty="0"/>
           </a:p>
@@ -866,6 +867,216 @@
             </a:r>
             <a:r>
               <a:rPr lang="en-US" baseline="0" dirty="0" smtClean="0"/>
+              <a:t> is comprised of multiple components that can be thought of in three parts. </a:t>
+            </a:r>
+          </a:p>
+          <a:p>
+            <a:endParaRPr lang="en-US" baseline="0" dirty="0" smtClean="0"/>
+          </a:p>
+          <a:p>
+            <a:r>
+              <a:rPr lang="en-US" b="1" baseline="0" dirty="0" smtClean="0"/>
+              <a:t>Clients</a:t>
+            </a:r>
+            <a:r>
+              <a:rPr lang="en-US" baseline="0" dirty="0" smtClean="0"/>
+              <a:t> – the operating system or programming environment that can make calls using </a:t>
+            </a:r>
+            <a:r>
+              <a:rPr lang="en-US" baseline="0" dirty="0" err="1" smtClean="0"/>
+              <a:t>SignalR</a:t>
+            </a:r>
+            <a:r>
+              <a:rPr lang="en-US" baseline="0" dirty="0" smtClean="0"/>
+              <a:t>. Numerous </a:t>
+            </a:r>
+            <a:r>
+              <a:rPr lang="en-US" baseline="0" dirty="0" err="1" smtClean="0"/>
+              <a:t>SignalR</a:t>
+            </a:r>
+            <a:r>
+              <a:rPr lang="en-US" baseline="0" dirty="0" smtClean="0"/>
+              <a:t> clients exist for everything from JavaScript to </a:t>
+            </a:r>
+            <a:r>
+              <a:rPr lang="en-US" baseline="0" dirty="0" err="1" smtClean="0"/>
+              <a:t>iOS</a:t>
+            </a:r>
+            <a:r>
+              <a:rPr lang="en-US" baseline="0" dirty="0" smtClean="0"/>
+              <a:t>, most of which began as community contributions. </a:t>
+            </a:r>
+            <a:r>
+              <a:rPr lang="en-US" b="1" baseline="0" dirty="0" smtClean="0"/>
+              <a:t>CLICK to fade in Clients</a:t>
+            </a:r>
+          </a:p>
+          <a:p>
+            <a:endParaRPr lang="en-US" dirty="0" smtClean="0"/>
+          </a:p>
+          <a:p>
+            <a:r>
+              <a:rPr lang="en-US" b="1" dirty="0" smtClean="0"/>
+              <a:t>Hosts </a:t>
+            </a:r>
+            <a:r>
+              <a:rPr lang="en-US" b="0" dirty="0" smtClean="0"/>
+              <a:t>– </a:t>
+            </a:r>
+            <a:r>
+              <a:rPr lang="en-US" b="0" dirty="0" err="1" smtClean="0"/>
+              <a:t>SignalR</a:t>
+            </a:r>
+            <a:r>
+              <a:rPr lang="en-US" b="0" baseline="0" dirty="0" smtClean="0"/>
+              <a:t> can be hosted in ASP.NET, as is the traditional method. There also exists capability to self-host </a:t>
+            </a:r>
+            <a:r>
+              <a:rPr lang="en-US" b="0" baseline="0" dirty="0" err="1" smtClean="0"/>
+              <a:t>SignalR</a:t>
+            </a:r>
+            <a:r>
+              <a:rPr lang="en-US" b="0" baseline="0" dirty="0" smtClean="0"/>
+              <a:t>, so you could host a hub in an EXE or in a Windows Azure worker role. </a:t>
+            </a:r>
+            <a:r>
+              <a:rPr lang="en-US" b="1" baseline="0" dirty="0" smtClean="0"/>
+              <a:t>CLICK to fade in Hosts</a:t>
+            </a:r>
+            <a:endParaRPr lang="en-US" b="0" baseline="0" dirty="0" smtClean="0"/>
+          </a:p>
+          <a:p>
+            <a:endParaRPr lang="en-US" b="0" baseline="0" dirty="0" smtClean="0"/>
+          </a:p>
+          <a:p>
+            <a:r>
+              <a:rPr lang="en-US" b="1" baseline="0" dirty="0" smtClean="0"/>
+              <a:t>Backplanes – </a:t>
+            </a:r>
+            <a:r>
+              <a:rPr lang="en-US" b="0" baseline="0" dirty="0" err="1" smtClean="0"/>
+              <a:t>SignalR</a:t>
+            </a:r>
+            <a:r>
+              <a:rPr lang="en-US" b="0" baseline="0" dirty="0" smtClean="0"/>
+              <a:t> isn’t load-balancer friendly out of the box. Hubs live on one server or role instance. If an application that is to be load-balanced needs to make use of </a:t>
+            </a:r>
+            <a:r>
+              <a:rPr lang="en-US" b="0" baseline="0" dirty="0" err="1" smtClean="0"/>
+              <a:t>SignalR</a:t>
+            </a:r>
+            <a:r>
+              <a:rPr lang="en-US" b="0" baseline="0" dirty="0" smtClean="0"/>
+              <a:t>, that application needs a backplane behind the servers or instances running the application.</a:t>
+            </a:r>
+          </a:p>
+          <a:p>
+            <a:endParaRPr lang="en-US" b="0" baseline="0" dirty="0" smtClean="0"/>
+          </a:p>
+          <a:p>
+            <a:r>
+              <a:rPr lang="en-US" b="0" baseline="0" dirty="0" smtClean="0"/>
+              <a:t>Backplane support was completely re-written for the 1.0 alpha release. Currently, three backplanes exist – SQL Server, Service Bus, and </a:t>
+            </a:r>
+            <a:r>
+              <a:rPr lang="en-US" b="0" baseline="0" dirty="0" err="1" smtClean="0"/>
+              <a:t>Redis</a:t>
+            </a:r>
+            <a:r>
+              <a:rPr lang="en-US" b="0" baseline="0" dirty="0" smtClean="0"/>
+              <a:t>.</a:t>
+            </a:r>
+            <a:endParaRPr lang="en-US" b="1" dirty="0"/>
+          </a:p>
+        </p:txBody>
+      </p:sp>
+      <p:sp>
+        <p:nvSpPr>
+          <p:cNvPr id="4" name="Slide Number Placeholder 3"/>
+          <p:cNvSpPr>
+            <a:spLocks noGrp="1"/>
+          </p:cNvSpPr>
+          <p:nvPr>
+            <p:ph type="sldNum" sz="quarter" idx="10"/>
+          </p:nvPr>
+        </p:nvSpPr>
+        <p:spPr/>
+        <p:txBody>
+          <a:bodyPr/>
+          <a:lstStyle/>
+          <a:p>
+            <a:fld id="{82AABF77-E2E4-44CA-BA5C-65E132CF08D8}" type="slidenum">
+              <a:rPr lang="en-US" smtClean="0"/>
+              <a:pPr/>
+              <a:t>11</a:t>
+            </a:fld>
+            <a:endParaRPr lang="en-US" dirty="0"/>
+          </a:p>
+        </p:txBody>
+      </p:sp>
+    </p:spTree>
+    <p:extLst>
+      <p:ext uri="{BB962C8B-B14F-4D97-AF65-F5344CB8AC3E}">
+        <p14:creationId xmlns:p14="http://schemas.microsoft.com/office/powerpoint/2010/main" val="2329335469"/>
+      </p:ext>
+    </p:extLst>
+  </p:cSld>
+  <p:clrMapOvr>
+    <a:masterClrMapping/>
+  </p:clrMapOvr>
+</p:notes>
+</file>
+
+<file path=ppt/notesSlides/notesSlide11.xml><?xml version="1.0" encoding="utf-8"?>
+<p:notes xmlns:a="http://schemas.openxmlformats.org/drawingml/2006/main" xmlns:r="http://schemas.openxmlformats.org/officeDocument/2006/relationships" xmlns:p="http://schemas.openxmlformats.org/presentationml/2006/main">
+  <p:cSld>
+    <p:spTree>
+      <p:nvGrpSpPr>
+        <p:cNvPr id="1" name=""/>
+        <p:cNvGrpSpPr/>
+        <p:nvPr/>
+      </p:nvGrpSpPr>
+      <p:grpSpPr>
+        <a:xfrm>
+          <a:off x="0" y="0"/>
+          <a:ext cx="0" cy="0"/>
+          <a:chOff x="0" y="0"/>
+          <a:chExt cx="0" cy="0"/>
+        </a:xfrm>
+      </p:grpSpPr>
+      <p:sp>
+        <p:nvSpPr>
+          <p:cNvPr id="2" name="Slide Image Placeholder 1"/>
+          <p:cNvSpPr>
+            <a:spLocks noGrp="1" noRot="1" noChangeAspect="1"/>
+          </p:cNvSpPr>
+          <p:nvPr>
+            <p:ph type="sldImg"/>
+          </p:nvPr>
+        </p:nvSpPr>
+        <p:spPr/>
+      </p:sp>
+      <p:sp>
+        <p:nvSpPr>
+          <p:cNvPr id="3" name="Notes Placeholder 2"/>
+          <p:cNvSpPr>
+            <a:spLocks noGrp="1"/>
+          </p:cNvSpPr>
+          <p:nvPr>
+            <p:ph type="body" idx="1"/>
+          </p:nvPr>
+        </p:nvSpPr>
+        <p:spPr/>
+        <p:txBody>
+          <a:bodyPr/>
+          <a:lstStyle/>
+          <a:p>
+            <a:r>
+              <a:rPr lang="en-US" dirty="0" err="1" smtClean="0"/>
+              <a:t>SignalR</a:t>
+            </a:r>
+            <a:r>
+              <a:rPr lang="en-US" baseline="0" dirty="0" smtClean="0"/>
               <a:t> needs a backplane to scale. In a multi-server or multi-instance environment, communication sent from the client will only land on the server from which the originating call was made. If other users are actively connected to the application, but on different servers, the real-time communication won’t cross the servers. </a:t>
             </a:r>
             <a:r>
@@ -920,7 +1131,7 @@
             <a:fld id="{82AABF77-E2E4-44CA-BA5C-65E132CF08D8}" type="slidenum">
               <a:rPr lang="en-US" smtClean="0"/>
               <a:pPr/>
-              <a:t>11</a:t>
+              <a:t>12</a:t>
             </a:fld>
             <a:endParaRPr lang="en-US" dirty="0"/>
           </a:p>
@@ -1084,26 +1295,6 @@
           <a:bodyPr/>
           <a:lstStyle/>
           <a:p>
-            <a:r>
-              <a:rPr lang="en-US" dirty="0" smtClean="0"/>
-              <a:t>This quote, by Arthur C. Clarke, doe</a:t>
-            </a:r>
-            <a:r>
-              <a:rPr lang="en-US" baseline="0" dirty="0" smtClean="0"/>
-              <a:t>s a great job of explaining </a:t>
-            </a:r>
-            <a:r>
-              <a:rPr lang="en-US" baseline="0" dirty="0" err="1" smtClean="0"/>
-              <a:t>SignalR</a:t>
-            </a:r>
-            <a:r>
-              <a:rPr lang="en-US" baseline="0" dirty="0" smtClean="0"/>
-              <a:t>. It does so well what it does that it tends to seem like what it’d doing isn’t </a:t>
-            </a:r>
-            <a:r>
-              <a:rPr lang="en-US" baseline="0" dirty="0" err="1" smtClean="0"/>
-              <a:t>realli</a:t>
-            </a:r>
             <a:endParaRPr lang="en-US" dirty="0"/>
           </a:p>
         </p:txBody>
@@ -1135,7 +1326,7 @@
     </p:spTree>
     <p:extLst>
       <p:ext uri="{BB962C8B-B14F-4D97-AF65-F5344CB8AC3E}">
-        <p14:creationId xmlns:p14="http://schemas.microsoft.com/office/powerpoint/2010/main" val="1896127707"/>
+        <p14:creationId xmlns:p14="http://schemas.microsoft.com/office/powerpoint/2010/main" val="2944201526"/>
       </p:ext>
     </p:extLst>
   </p:cSld>
@@ -1189,6 +1380,26 @@
           <a:bodyPr/>
           <a:lstStyle/>
           <a:p>
+            <a:r>
+              <a:rPr lang="en-US" dirty="0" smtClean="0"/>
+              <a:t>This quote, by Arthur C. Clarke, doe</a:t>
+            </a:r>
+            <a:r>
+              <a:rPr lang="en-US" baseline="0" dirty="0" smtClean="0"/>
+              <a:t>s a great job of explaining </a:t>
+            </a:r>
+            <a:r>
+              <a:rPr lang="en-US" baseline="0" dirty="0" err="1" smtClean="0"/>
+              <a:t>SignalR</a:t>
+            </a:r>
+            <a:r>
+              <a:rPr lang="en-US" baseline="0" dirty="0" smtClean="0"/>
+              <a:t>. It does so well what it does that it tends to seem like what it’d doing isn’t </a:t>
+            </a:r>
+            <a:r>
+              <a:rPr lang="en-US" baseline="0" dirty="0" err="1" smtClean="0"/>
+              <a:t>realli</a:t>
+            </a:r>
             <a:endParaRPr lang="en-US" dirty="0"/>
           </a:p>
         </p:txBody>
@@ -1211,7 +1422,7 @@
             <a:fld id="{82AABF77-E2E4-44CA-BA5C-65E132CF08D8}" type="slidenum">
               <a:rPr lang="en-US" smtClean="0"/>
               <a:pPr/>
-              <a:t>4</a:t>
+              <a:t>5</a:t>
             </a:fld>
             <a:endParaRPr lang="en-US" dirty="0"/>
           </a:p>
@@ -1220,7 +1431,7 @@
     </p:spTree>
     <p:extLst>
       <p:ext uri="{BB962C8B-B14F-4D97-AF65-F5344CB8AC3E}">
-        <p14:creationId xmlns:p14="http://schemas.microsoft.com/office/powerpoint/2010/main" val="2944201526"/>
+        <p14:creationId xmlns:p14="http://schemas.microsoft.com/office/powerpoint/2010/main" val="4049443355"/>
       </p:ext>
     </p:extLst>
   </p:cSld>
@@ -2421,19 +2632,19 @@
           <a:p>
             <a:r>
               <a:rPr lang="en-US" dirty="0" smtClean="0"/>
-              <a:t>The Fireworks demo is a simple multi-player</a:t>
+              <a:t>This demonstrates the way </a:t>
+            </a:r>
+            <a:r>
+              <a:rPr lang="en-US" dirty="0" err="1" smtClean="0"/>
+              <a:t>SignalR</a:t>
+            </a:r>
+            <a:r>
+              <a:rPr lang="en-US" dirty="0" smtClean="0"/>
+              <a:t> works over an</a:t>
             </a:r>
             <a:r>
               <a:rPr lang="en-US" baseline="0" dirty="0" smtClean="0"/>
-              <a:t> game that demonstrates more of what’s possible with </a:t>
-            </a:r>
-            <a:r>
-              <a:rPr lang="en-US" baseline="0" dirty="0" err="1" smtClean="0"/>
-              <a:t>SignalR</a:t>
-            </a:r>
-            <a:r>
-              <a:rPr lang="en-US" baseline="0" dirty="0" smtClean="0"/>
-              <a:t>.</a:t>
+              <a:t> HTTP connection using Web Sockets or Server Sent Events. </a:t>
             </a:r>
           </a:p>
           <a:p>
@@ -2441,15 +2652,39 @@
           </a:p>
           <a:p>
             <a:r>
+              <a:rPr lang="en-US" baseline="0" dirty="0" smtClean="0"/>
+              <a:t>The client makes the request to determine if the server does real-time. </a:t>
+            </a:r>
+            <a:r>
               <a:rPr lang="en-US" b="1" baseline="0" dirty="0" smtClean="0"/>
-              <a:t>Demo Script</a:t>
-            </a:r>
+              <a:t>CLICK</a:t>
+            </a:r>
+            <a:endParaRPr lang="en-US" b="0" baseline="0" dirty="0" smtClean="0"/>
           </a:p>
           <a:p>
             <a:r>
               <a:rPr lang="en-US" b="0" baseline="0" dirty="0" smtClean="0"/>
-              <a:t>Open Firework-End solution. </a:t>
-            </a:r>
+              <a:t>The server responds to the client to let the client know Web Sockets or SSE are supported. </a:t>
+            </a:r>
+            <a:r>
+              <a:rPr lang="en-US" b="1" baseline="0" dirty="0" smtClean="0"/>
+              <a:t>CLICK</a:t>
+            </a:r>
+            <a:endParaRPr lang="en-US" b="0" baseline="0" dirty="0" smtClean="0"/>
+          </a:p>
+          <a:p>
+            <a:r>
+              <a:rPr lang="en-US" b="0" baseline="0" dirty="0" smtClean="0"/>
+              <a:t>The real-time connection is established and used for the lifetime of the conversation. </a:t>
+            </a:r>
+            <a:r>
+              <a:rPr lang="en-US" b="1" baseline="0" dirty="0" smtClean="0"/>
+              <a:t>CLICK</a:t>
+            </a:r>
+            <a:endParaRPr lang="en-US" b="0" baseline="0" dirty="0" smtClean="0"/>
+          </a:p>
+          <a:p>
+            <a:endParaRPr lang="en-US" b="0" dirty="0" smtClean="0"/>
           </a:p>
           <a:p>
             <a:pPr marL="0" marR="0" indent="0" algn="l" defTabSz="1218987" rtl="0" eaLnBrk="1" fontAlgn="auto" latinLnBrk="0" hangingPunct="1">
@@ -2470,22 +2705,8 @@
               <a:defRPr/>
             </a:pPr>
             <a:r>
-              <a:rPr lang="en-US" b="0" baseline="0" dirty="0" smtClean="0"/>
-              <a:t>Walk through server-side </a:t>
-            </a:r>
-            <a:r>
-              <a:rPr lang="en-US" b="0" baseline="0" dirty="0" err="1" smtClean="0"/>
-              <a:t>SignalR</a:t>
-            </a:r>
-            <a:r>
-              <a:rPr lang="en-US" b="0" baseline="0" dirty="0" smtClean="0"/>
-              <a:t> Hub to show what it does</a:t>
-            </a:r>
-          </a:p>
-          <a:p>
-            <a:r>
-              <a:rPr lang="en-US" b="0" baseline="0" dirty="0" smtClean="0"/>
-              <a:t>Walk through JavaScript code that makes the Hub connection</a:t>
+              <a:rPr lang="en-US" baseline="0" dirty="0" smtClean="0"/>
+              <a:t>If both ends of the connection support one of the later, real-time connection methods, real-time communication is enabled.</a:t>
             </a:r>
           </a:p>
         </p:txBody>
@@ -2517,7 +2738,7 @@
     </p:spTree>
     <p:extLst>
       <p:ext uri="{BB962C8B-B14F-4D97-AF65-F5344CB8AC3E}">
-        <p14:creationId xmlns:p14="http://schemas.microsoft.com/office/powerpoint/2010/main" val="2088282267"/>
+        <p14:creationId xmlns:p14="http://schemas.microsoft.com/office/powerpoint/2010/main" val="1069808798"/>
       </p:ext>
     </p:extLst>
   </p:cSld>
@@ -2572,12 +2793,20 @@
           <a:lstStyle/>
           <a:p>
             <a:r>
-              <a:rPr lang="en-US" dirty="0" err="1" smtClean="0"/>
+              <a:rPr lang="en-US" dirty="0" smtClean="0"/>
+              <a:t>The Fireworks demo is a simple multi-player</a:t>
+            </a:r>
+            <a:r>
+              <a:rPr lang="en-US" baseline="0" dirty="0" smtClean="0"/>
+              <a:t> game that demonstrates more of what’s possible with </a:t>
+            </a:r>
+            <a:r>
+              <a:rPr lang="en-US" baseline="0" dirty="0" err="1" smtClean="0"/>
               <a:t>SignalR</a:t>
             </a:r>
             <a:r>
               <a:rPr lang="en-US" baseline="0" dirty="0" smtClean="0"/>
-              <a:t> is comprised of multiple components that can be thought of in three parts. </a:t>
+              <a:t>.</a:t>
             </a:r>
           </a:p>
           <a:p>
@@ -2586,60 +2815,36 @@
           <a:p>
             <a:r>
               <a:rPr lang="en-US" b="1" baseline="0" dirty="0" smtClean="0"/>
-              <a:t>Clients</a:t>
-            </a:r>
-            <a:r>
-              <a:rPr lang="en-US" baseline="0" dirty="0" smtClean="0"/>
-              <a:t> – the operating system or programming environment that can make calls using </a:t>
-            </a:r>
-            <a:r>
-              <a:rPr lang="en-US" baseline="0" dirty="0" err="1" smtClean="0"/>
-              <a:t>SignalR</a:t>
-            </a:r>
-            <a:r>
-              <a:rPr lang="en-US" baseline="0" dirty="0" smtClean="0"/>
-              <a:t>. Numerous </a:t>
-            </a:r>
-            <a:r>
-              <a:rPr lang="en-US" baseline="0" dirty="0" err="1" smtClean="0"/>
-              <a:t>SignalR</a:t>
-            </a:r>
-            <a:r>
-              <a:rPr lang="en-US" baseline="0" dirty="0" smtClean="0"/>
-              <a:t> clients exist for everything from JavaScript to </a:t>
-            </a:r>
-            <a:r>
-              <a:rPr lang="en-US" baseline="0" dirty="0" err="1" smtClean="0"/>
-              <a:t>iOS</a:t>
-            </a:r>
-            <a:r>
-              <a:rPr lang="en-US" baseline="0" dirty="0" smtClean="0"/>
-              <a:t>, most of which began as community contributions. </a:t>
-            </a:r>
-            <a:r>
-              <a:rPr lang="en-US" b="1" baseline="0" dirty="0" smtClean="0"/>
-              <a:t>CLICK to fade in Clients</a:t>
+              <a:t>Demo Script</a:t>
             </a:r>
           </a:p>
           <a:p>
-            <a:endParaRPr lang="en-US" dirty="0" smtClean="0"/>
+            <a:r>
+              <a:rPr lang="en-US" b="0" baseline="0" dirty="0" smtClean="0"/>
+              <a:t>Open Firework-End solution. </a:t>
+            </a:r>
           </a:p>
           <a:p>
-            <a:r>
-              <a:rPr lang="en-US" b="1" dirty="0" smtClean="0"/>
-              <a:t>Hosts </a:t>
-            </a:r>
-            <a:r>
-              <a:rPr lang="en-US" b="0" dirty="0" smtClean="0"/>
-              <a:t>– </a:t>
-            </a:r>
-            <a:r>
-              <a:rPr lang="en-US" b="0" dirty="0" err="1" smtClean="0"/>
-              <a:t>SignalR</a:t>
-            </a:r>
+            <a:pPr marL="0" marR="0" indent="0" algn="l" defTabSz="1218987" rtl="0" eaLnBrk="1" fontAlgn="auto" latinLnBrk="0" hangingPunct="1">
+              <a:lnSpc>
+                <a:spcPct val="100000"/>
+              </a:lnSpc>
+              <a:spcBef>
+                <a:spcPts val="0"/>
+              </a:spcBef>
+              <a:spcAft>
+                <a:spcPts val="0"/>
+              </a:spcAft>
+              <a:buClrTx/>
+              <a:buSzTx/>
+              <a:buFontTx/>
+              <a:buNone/>
+              <a:tabLst/>
+              <a:defRPr/>
+            </a:pPr>
             <a:r>
               <a:rPr lang="en-US" b="0" baseline="0" dirty="0" smtClean="0"/>
-              <a:t> can be hosted in ASP.NET, as is the traditional method. There also exists capability to self-host </a:t>
+              <a:t>Walk through server-side </a:t>
             </a:r>
             <a:r>
               <a:rPr lang="en-US" b="0" baseline="0" dirty="0" err="1" smtClean="0"/>
@@ -2647,56 +2852,14 @@
             </a:r>
             <a:r>
               <a:rPr lang="en-US" b="0" baseline="0" dirty="0" smtClean="0"/>
-              <a:t>, so you could host a hub in an EXE or in a Windows Azure worker role. </a:t>
-            </a:r>
-            <a:r>
-              <a:rPr lang="en-US" b="1" baseline="0" dirty="0" smtClean="0"/>
-              <a:t>CLICK to fade in Hosts</a:t>
-            </a:r>
-            <a:endParaRPr lang="en-US" b="0" baseline="0" dirty="0" smtClean="0"/>
+              <a:t> Hub to show what it does</a:t>
+            </a:r>
           </a:p>
           <a:p>
-            <a:endParaRPr lang="en-US" b="0" baseline="0" dirty="0" smtClean="0"/>
-          </a:p>
-          <a:p>
-            <a:r>
-              <a:rPr lang="en-US" b="1" baseline="0" dirty="0" smtClean="0"/>
-              <a:t>Backplanes – </a:t>
-            </a:r>
-            <a:r>
-              <a:rPr lang="en-US" b="0" baseline="0" dirty="0" err="1" smtClean="0"/>
-              <a:t>SignalR</a:t>
-            </a:r>
             <a:r>
               <a:rPr lang="en-US" b="0" baseline="0" dirty="0" smtClean="0"/>
-              <a:t> isn’t load-balancer friendly out of the box. Hubs live on one server or role instance. If an application that is to be load-balanced needs to make use of </a:t>
-            </a:r>
-            <a:r>
-              <a:rPr lang="en-US" b="0" baseline="0" dirty="0" err="1" smtClean="0"/>
-              <a:t>SignalR</a:t>
-            </a:r>
-            <a:r>
-              <a:rPr lang="en-US" b="0" baseline="0" dirty="0" smtClean="0"/>
-              <a:t>, that application needs a backplane behind the servers or instances running the application.</a:t>
-            </a:r>
-          </a:p>
-          <a:p>
-            <a:endParaRPr lang="en-US" b="0" baseline="0" dirty="0" smtClean="0"/>
-          </a:p>
-          <a:p>
-            <a:r>
-              <a:rPr lang="en-US" b="0" baseline="0" dirty="0" smtClean="0"/>
-              <a:t>Backplane support was completely re-written for the 1.0 alpha release. Currently, three backplanes exist – SQL Server, Service Bus, and </a:t>
-            </a:r>
-            <a:r>
-              <a:rPr lang="en-US" b="0" baseline="0" dirty="0" err="1" smtClean="0"/>
-              <a:t>Redis</a:t>
-            </a:r>
-            <a:r>
-              <a:rPr lang="en-US" b="0" baseline="0" dirty="0" smtClean="0"/>
-              <a:t>.</a:t>
-            </a:r>
-            <a:endParaRPr lang="en-US" b="1" dirty="0"/>
+              <a:t>Walk through JavaScript code that makes the Hub connection</a:t>
+            </a:r>
           </a:p>
         </p:txBody>
       </p:sp>
@@ -2727,7 +2890,7 @@
     </p:spTree>
     <p:extLst>
       <p:ext uri="{BB962C8B-B14F-4D97-AF65-F5344CB8AC3E}">
-        <p14:creationId xmlns:p14="http://schemas.microsoft.com/office/powerpoint/2010/main" val="2329335469"/>
+        <p14:creationId xmlns:p14="http://schemas.microsoft.com/office/powerpoint/2010/main" val="2088282267"/>
       </p:ext>
     </p:extLst>
   </p:cSld>
@@ -16268,6 +16431,111 @@
       </p:grpSpPr>
       <p:sp>
         <p:nvSpPr>
+          <p:cNvPr id="13" name="Title 12"/>
+          <p:cNvSpPr>
+            <a:spLocks noGrp="1"/>
+          </p:cNvSpPr>
+          <p:nvPr>
+            <p:ph type="ctrTitle"/>
+          </p:nvPr>
+        </p:nvSpPr>
+        <p:spPr/>
+        <p:txBody>
+          <a:bodyPr/>
+          <a:lstStyle/>
+          <a:p>
+            <a:r>
+              <a:rPr lang="en-US" dirty="0" smtClean="0"/>
+              <a:t>Demo</a:t>
+            </a:r>
+            <a:endParaRPr lang="en-US" dirty="0"/>
+          </a:p>
+        </p:txBody>
+      </p:sp>
+      <p:sp>
+        <p:nvSpPr>
+          <p:cNvPr id="2" name="Subtitle 1"/>
+          <p:cNvSpPr>
+            <a:spLocks noGrp="1"/>
+          </p:cNvSpPr>
+          <p:nvPr>
+            <p:ph type="subTitle" idx="1"/>
+          </p:nvPr>
+        </p:nvSpPr>
+        <p:spPr/>
+        <p:txBody>
+          <a:bodyPr/>
+          <a:lstStyle/>
+          <a:p>
+            <a:endParaRPr lang="en-US"/>
+          </a:p>
+        </p:txBody>
+      </p:sp>
+      <p:sp>
+        <p:nvSpPr>
+          <p:cNvPr id="15" name="Text Placeholder 14"/>
+          <p:cNvSpPr>
+            <a:spLocks noGrp="1"/>
+          </p:cNvSpPr>
+          <p:nvPr>
+            <p:ph type="body" sz="quarter" idx="10"/>
+          </p:nvPr>
+        </p:nvSpPr>
+        <p:spPr/>
+        <p:txBody>
+          <a:bodyPr/>
+          <a:lstStyle/>
+          <a:p>
+            <a:r>
+              <a:rPr lang="en-US" dirty="0" smtClean="0"/>
+              <a:t>Online Gaming</a:t>
+            </a:r>
+            <a:endParaRPr lang="en-US" dirty="0"/>
+          </a:p>
+        </p:txBody>
+      </p:sp>
+    </p:spTree>
+    <p:extLst>
+      <p:ext uri="{BB962C8B-B14F-4D97-AF65-F5344CB8AC3E}">
+        <p14:creationId xmlns:p14="http://schemas.microsoft.com/office/powerpoint/2010/main" val="3624967951"/>
+      </p:ext>
+    </p:extLst>
+  </p:cSld>
+  <p:clrMapOvr>
+    <a:masterClrMapping/>
+  </p:clrMapOvr>
+  <p:transition>
+    <p:fade/>
+  </p:transition>
+  <p:timing>
+    <p:tnLst>
+      <p:par>
+        <p:cTn id="1" dur="indefinite" restart="never" nodeType="tmRoot"/>
+      </p:par>
+    </p:tnLst>
+  </p:timing>
+</p:sld>
+</file>
+
+<file path=ppt/slides/slide11.xml><?xml version="1.0" encoding="utf-8"?>
+<p:sld xmlns:a="http://schemas.openxmlformats.org/drawingml/2006/main" xmlns:r="http://schemas.openxmlformats.org/officeDocument/2006/relationships" xmlns:p="http://schemas.openxmlformats.org/presentationml/2006/main">
+  <p:cSld>
+    <p:spTree>
+      <p:nvGrpSpPr>
+        <p:cNvPr id="1" name=""/>
+        <p:cNvGrpSpPr/>
+        <p:nvPr/>
+      </p:nvGrpSpPr>
+      <p:grpSpPr>
+        <a:xfrm>
+          <a:off x="0" y="0"/>
+          <a:ext cx="0" cy="0"/>
+          <a:chOff x="0" y="0"/>
+          <a:chExt cx="0" cy="0"/>
+        </a:xfrm>
+      </p:grpSpPr>
+      <p:sp>
+        <p:nvSpPr>
           <p:cNvPr id="4" name="Title 1"/>
           <p:cNvSpPr>
             <a:spLocks noGrp="1"/>
@@ -17298,79 +17566,6 @@
       </p:sp>
       <p:sp>
         <p:nvSpPr>
-          <p:cNvPr id="19" name="Rectangle 18"/>
-          <p:cNvSpPr/>
-          <p:nvPr/>
-        </p:nvSpPr>
-        <p:spPr bwMode="auto">
-          <a:xfrm>
-            <a:off x="3828525" y="3785307"/>
-            <a:ext cx="1460527" cy="1460500"/>
-          </a:xfrm>
-          <a:prstGeom prst="rect">
-            <a:avLst/>
-          </a:prstGeom>
-          <a:solidFill>
-            <a:schemeClr val="accent1"/>
-          </a:solidFill>
-          <a:ln>
-            <a:noFill/>
-            <a:headEnd type="none" w="med" len="med"/>
-            <a:tailEnd type="none" w="med" len="med"/>
-          </a:ln>
-          <a:effectLst/>
-        </p:spPr>
-        <p:style>
-          <a:lnRef idx="1">
-            <a:schemeClr val="accent2"/>
-          </a:lnRef>
-          <a:fillRef idx="3">
-            <a:schemeClr val="accent2"/>
-          </a:fillRef>
-          <a:effectRef idx="2">
-            <a:schemeClr val="accent2"/>
-          </a:effectRef>
-          <a:fontRef idx="minor">
-            <a:schemeClr val="lt1"/>
-          </a:fontRef>
-        </p:style>
-        <p:txBody>
-          <a:bodyPr vert="horz" wrap="square" lIns="91436" tIns="45718" rIns="91436" bIns="45718" numCol="1" rtlCol="0" anchor="ctr" anchorCtr="0" compatLnSpc="1">
-            <a:prstTxWarp prst="textNoShape">
-              <a:avLst/>
-            </a:prstTxWarp>
-          </a:bodyPr>
-          <a:lstStyle/>
-          <a:p>
-            <a:pPr algn="ctr" defTabSz="914099" fontAlgn="base">
-              <a:spcBef>
-                <a:spcPct val="0"/>
-              </a:spcBef>
-              <a:spcAft>
-                <a:spcPct val="0"/>
-              </a:spcAft>
-            </a:pPr>
-            <a:r>
-              <a:rPr lang="en-US" sz="2200" dirty="0" smtClean="0">
-                <a:gradFill>
-                  <a:gsLst>
-                    <a:gs pos="0">
-                      <a:srgbClr val="FFFFFF"/>
-                    </a:gs>
-                    <a:gs pos="100000">
-                      <a:srgbClr val="FFFFFF"/>
-                    </a:gs>
-                  </a:gsLst>
-                  <a:lin ang="5400000" scaled="0"/>
-                </a:gradFill>
-              </a:rPr>
-              <a:t>Self</a:t>
-            </a:r>
-          </a:p>
-        </p:txBody>
-      </p:sp>
-      <p:sp>
-        <p:nvSpPr>
           <p:cNvPr id="20" name="Rectangle 19"/>
           <p:cNvSpPr/>
           <p:nvPr/>
@@ -17536,7 +17731,7 @@
         </p:nvSpPr>
         <p:spPr>
           <a:xfrm>
-            <a:off x="2549688" y="5650140"/>
+            <a:off x="1765920" y="5650140"/>
             <a:ext cx="926536" cy="387798"/>
           </a:xfrm>
           <a:prstGeom prst="rect">
@@ -17575,8 +17770,8 @@
         </p:nvSpPr>
         <p:spPr>
           <a:xfrm rot="5400000">
-            <a:off x="2835180" y="3178503"/>
-            <a:ext cx="353790" cy="4552193"/>
+            <a:off x="2066403" y="3947281"/>
+            <a:ext cx="345952" cy="3006800"/>
           </a:xfrm>
           <a:prstGeom prst="rightBrace">
             <a:avLst/>
@@ -18386,7 +18581,7 @@
                                           </p:stCondLst>
                                         </p:cTn>
                                         <p:tgtEl>
-                                          <p:spTgt spid="19"/>
+                                          <p:spTgt spid="6"/>
                                         </p:tgtEl>
                                         <p:attrNameLst>
                                           <p:attrName>style.visibility</p:attrName>
@@ -18399,79 +18594,6 @@
                                     <p:anim calcmode="lin" valueType="num">
                                       <p:cBhvr additive="base">
                                         <p:cTn id="52" dur="500" fill="hold"/>
-                                        <p:tgtEl>
-                                          <p:spTgt spid="19"/>
-                                        </p:tgtEl>
-                                        <p:attrNameLst>
-                                          <p:attrName>ppt_x</p:attrName>
-                                        </p:attrNameLst>
-                                      </p:cBhvr>
-                                      <p:tavLst>
-                                        <p:tav tm="0">
-                                          <p:val>
-                                            <p:strVal val="#ppt_x"/>
-                                          </p:val>
-                                        </p:tav>
-                                        <p:tav tm="100000">
-                                          <p:val>
-                                            <p:strVal val="#ppt_x"/>
-                                          </p:val>
-                                        </p:tav>
-                                      </p:tavLst>
-                                    </p:anim>
-                                    <p:anim calcmode="lin" valueType="num">
-                                      <p:cBhvr additive="base">
-                                        <p:cTn id="53" dur="500" fill="hold"/>
-                                        <p:tgtEl>
-                                          <p:spTgt spid="19"/>
-                                        </p:tgtEl>
-                                        <p:attrNameLst>
-                                          <p:attrName>ppt_y</p:attrName>
-                                        </p:attrNameLst>
-                                      </p:cBhvr>
-                                      <p:tavLst>
-                                        <p:tav tm="0">
-                                          <p:val>
-                                            <p:strVal val="1+#ppt_h/2"/>
-                                          </p:val>
-                                        </p:tav>
-                                        <p:tav tm="100000">
-                                          <p:val>
-                                            <p:strVal val="#ppt_y"/>
-                                          </p:val>
-                                        </p:tav>
-                                      </p:tavLst>
-                                    </p:anim>
-                                  </p:childTnLst>
-                                </p:cTn>
-                              </p:par>
-                              <p:par>
-                                <p:cTn id="54" presetID="2" presetClass="entr" presetSubtype="4" fill="hold" grpId="0" nodeType="withEffect">
-                                  <p:stCondLst>
-                                    <p:cond delay="0"/>
-                                  </p:stCondLst>
-                                  <p:childTnLst>
-                                    <p:set>
-                                      <p:cBhvr>
-                                        <p:cTn id="55" dur="1" fill="hold">
-                                          <p:stCondLst>
-                                            <p:cond delay="0"/>
-                                          </p:stCondLst>
-                                        </p:cTn>
-                                        <p:tgtEl>
-                                          <p:spTgt spid="6"/>
-                                        </p:tgtEl>
-                                        <p:attrNameLst>
-                                          <p:attrName>style.visibility</p:attrName>
-                                        </p:attrNameLst>
-                                      </p:cBhvr>
-                                      <p:to>
-                                        <p:strVal val="visible"/>
-                                      </p:to>
-                                    </p:set>
-                                    <p:anim calcmode="lin" valueType="num">
-                                      <p:cBhvr additive="base">
-                                        <p:cTn id="56" dur="500" fill="hold"/>
                                         <p:tgtEl>
                                           <p:spTgt spid="6"/>
                                         </p:tgtEl>
@@ -18494,7 +18616,7 @@
                                     </p:anim>
                                     <p:anim calcmode="lin" valueType="num">
                                       <p:cBhvr additive="base">
-                                        <p:cTn id="57" dur="500" fill="hold"/>
+                                        <p:cTn id="53" dur="500" fill="hold"/>
                                         <p:tgtEl>
                                           <p:spTgt spid="6"/>
                                         </p:tgtEl>
@@ -18525,26 +18647,26 @@
                     </p:cTn>
                   </p:par>
                   <p:par>
-                    <p:cTn id="58" fill="hold">
+                    <p:cTn id="54" fill="hold">
                       <p:stCondLst>
                         <p:cond delay="indefinite"/>
                       </p:stCondLst>
                       <p:childTnLst>
                         <p:par>
-                          <p:cTn id="59" fill="hold">
+                          <p:cTn id="55" fill="hold">
                             <p:stCondLst>
                               <p:cond delay="0"/>
                             </p:stCondLst>
                             <p:childTnLst>
                               <p:par>
-                                <p:cTn id="60" presetID="10" presetClass="entr" presetSubtype="0" fill="hold" grpId="0" nodeType="clickEffect">
+                                <p:cTn id="56" presetID="10" presetClass="entr" presetSubtype="0" fill="hold" grpId="0" nodeType="clickEffect">
                                   <p:stCondLst>
                                     <p:cond delay="0"/>
                                   </p:stCondLst>
                                   <p:childTnLst>
                                     <p:set>
                                       <p:cBhvr>
-                                        <p:cTn id="61" dur="1" fill="hold">
+                                        <p:cTn id="57" dur="1" fill="hold">
                                           <p:stCondLst>
                                             <p:cond delay="0"/>
                                           </p:stCondLst>
@@ -18562,7 +18684,7 @@
                                     </p:set>
                                     <p:animEffect transition="in" filter="fade">
                                       <p:cBhvr>
-                                        <p:cTn id="62" dur="500"/>
+                                        <p:cTn id="58" dur="500"/>
                                         <p:tgtEl>
                                           <p:spTgt spid="18"/>
                                         </p:tgtEl>
@@ -18572,14 +18694,14 @@
                                 </p:cTn>
                               </p:par>
                               <p:par>
-                                <p:cTn id="63" presetID="10" presetClass="entr" presetSubtype="0" fill="hold" grpId="0" nodeType="withEffect">
+                                <p:cTn id="59" presetID="10" presetClass="entr" presetSubtype="0" fill="hold" grpId="0" nodeType="withEffect">
                                   <p:stCondLst>
                                     <p:cond delay="0"/>
                                   </p:stCondLst>
                                   <p:childTnLst>
                                     <p:set>
                                       <p:cBhvr>
-                                        <p:cTn id="64" dur="1" fill="hold">
+                                        <p:cTn id="60" dur="1" fill="hold">
                                           <p:stCondLst>
                                             <p:cond delay="0"/>
                                           </p:stCondLst>
@@ -18597,7 +18719,7 @@
                                     </p:set>
                                     <p:animEffect transition="in" filter="fade">
                                       <p:cBhvr>
-                                        <p:cTn id="65" dur="500"/>
+                                        <p:cTn id="61" dur="500"/>
                                         <p:tgtEl>
                                           <p:spTgt spid="17"/>
                                         </p:tgtEl>
@@ -18610,20 +18732,20 @@
                           </p:cTn>
                         </p:par>
                         <p:par>
-                          <p:cTn id="66" fill="hold">
+                          <p:cTn id="62" fill="hold">
                             <p:stCondLst>
                               <p:cond delay="500"/>
                             </p:stCondLst>
                             <p:childTnLst>
                               <p:par>
-                                <p:cTn id="67" presetID="2" presetClass="entr" presetSubtype="4" fill="hold" grpId="0" nodeType="afterEffect">
+                                <p:cTn id="63" presetID="2" presetClass="entr" presetSubtype="4" fill="hold" grpId="0" nodeType="afterEffect">
                                   <p:stCondLst>
                                     <p:cond delay="0"/>
                                   </p:stCondLst>
                                   <p:childTnLst>
                                     <p:set>
                                       <p:cBhvr>
-                                        <p:cTn id="68" dur="1" fill="hold">
+                                        <p:cTn id="64" dur="1" fill="hold">
                                           <p:stCondLst>
                                             <p:cond delay="0"/>
                                           </p:stCondLst>
@@ -18641,7 +18763,7 @@
                                     </p:set>
                                     <p:anim calcmode="lin" valueType="num">
                                       <p:cBhvr additive="base">
-                                        <p:cTn id="69" dur="500" fill="hold"/>
+                                        <p:cTn id="65" dur="500" fill="hold"/>
                                         <p:tgtEl>
                                           <p:spTgt spid="20"/>
                                         </p:tgtEl>
@@ -18664,9 +18786,82 @@
                                     </p:anim>
                                     <p:anim calcmode="lin" valueType="num">
                                       <p:cBhvr additive="base">
+                                        <p:cTn id="66" dur="500" fill="hold"/>
+                                        <p:tgtEl>
+                                          <p:spTgt spid="20"/>
+                                        </p:tgtEl>
+                                        <p:attrNameLst>
+                                          <p:attrName>ppt_y</p:attrName>
+                                        </p:attrNameLst>
+                                      </p:cBhvr>
+                                      <p:tavLst>
+                                        <p:tav tm="0">
+                                          <p:val>
+                                            <p:strVal val="1+#ppt_h/2"/>
+                                          </p:val>
+                                        </p:tav>
+                                        <p:tav tm="100000">
+                                          <p:val>
+                                            <p:strVal val="#ppt_y"/>
+                                          </p:val>
+                                        </p:tav>
+                                      </p:tavLst>
+                                    </p:anim>
+                                  </p:childTnLst>
+                                </p:cTn>
+                              </p:par>
+                              <p:par>
+                                <p:cTn id="67" presetID="2" presetClass="entr" presetSubtype="4" fill="hold" grpId="0" nodeType="withEffect">
+                                  <p:stCondLst>
+                                    <p:cond delay="0"/>
+                                  </p:stCondLst>
+                                  <p:childTnLst>
+                                    <p:set>
+                                      <p:cBhvr>
+                                        <p:cTn id="68" dur="1" fill="hold">
+                                          <p:stCondLst>
+                                            <p:cond delay="0"/>
+                                          </p:stCondLst>
+                                        </p:cTn>
+                                        <p:tgtEl>
+                                          <p:spTgt spid="8"/>
+                                        </p:tgtEl>
+                                        <p:attrNameLst>
+                                          <p:attrName>style.visibility</p:attrName>
+                                        </p:attrNameLst>
+                                      </p:cBhvr>
+                                      <p:to>
+                                        <p:strVal val="visible"/>
+                                      </p:to>
+                                    </p:set>
+                                    <p:anim calcmode="lin" valueType="num">
+                                      <p:cBhvr additive="base">
+                                        <p:cTn id="69" dur="500" fill="hold"/>
+                                        <p:tgtEl>
+                                          <p:spTgt spid="8"/>
+                                        </p:tgtEl>
+                                        <p:attrNameLst>
+                                          <p:attrName>ppt_x</p:attrName>
+                                        </p:attrNameLst>
+                                      </p:cBhvr>
+                                      <p:tavLst>
+                                        <p:tav tm="0">
+                                          <p:val>
+                                            <p:strVal val="#ppt_x"/>
+                                          </p:val>
+                                        </p:tav>
+                                        <p:tav tm="100000">
+                                          <p:val>
+                                            <p:strVal val="#ppt_x"/>
+                                          </p:val>
+                                        </p:tav>
+                                      </p:tavLst>
+                                    </p:anim>
+                                    <p:anim calcmode="lin" valueType="num">
+                                      <p:cBhvr additive="base">
                                         <p:cTn id="70" dur="500" fill="hold"/>
                                         <p:tgtEl>
-                                          <p:spTgt spid="20"/>
+                                          <p:spTgt spid="8"/>
                                         </p:tgtEl>
                                         <p:attrNameLst>
                                           <p:attrName>ppt_y</p:attrName>
@@ -18702,7 +18897,7 @@
                                           </p:stCondLst>
                                         </p:cTn>
                                         <p:tgtEl>
-                                          <p:spTgt spid="8"/>
+                                          <p:spTgt spid="7"/>
                                         </p:tgtEl>
                                         <p:attrNameLst>
                                           <p:attrName>style.visibility</p:attrName>
@@ -18715,79 +18910,6 @@
                                     <p:anim calcmode="lin" valueType="num">
                                       <p:cBhvr additive="base">
                                         <p:cTn id="73" dur="500" fill="hold"/>
-                                        <p:tgtEl>
-                                          <p:spTgt spid="8"/>
-                                        </p:tgtEl>
-                                        <p:attrNameLst>
-                                          <p:attrName>ppt_x</p:attrName>
-                                        </p:attrNameLst>
-                                      </p:cBhvr>
-                                      <p:tavLst>
-                                        <p:tav tm="0">
-                                          <p:val>
-                                            <p:strVal val="#ppt_x"/>
-                                          </p:val>
-                                        </p:tav>
-                                        <p:tav tm="100000">
-                                          <p:val>
-                                            <p:strVal val="#ppt_x"/>
-                                          </p:val>
-                                        </p:tav>
-                                      </p:tavLst>
-                                    </p:anim>
-                                    <p:anim calcmode="lin" valueType="num">
-                                      <p:cBhvr additive="base">
-                                        <p:cTn id="74" dur="500" fill="hold"/>
-                                        <p:tgtEl>
-                                          <p:spTgt spid="8"/>
-                                        </p:tgtEl>
-                                        <p:attrNameLst>
-                                          <p:attrName>ppt_y</p:attrName>
-                                        </p:attrNameLst>
-                                      </p:cBhvr>
-                                      <p:tavLst>
-                                        <p:tav tm="0">
-                                          <p:val>
-                                            <p:strVal val="1+#ppt_h/2"/>
-                                          </p:val>
-                                        </p:tav>
-                                        <p:tav tm="100000">
-                                          <p:val>
-                                            <p:strVal val="#ppt_y"/>
-                                          </p:val>
-                                        </p:tav>
-                                      </p:tavLst>
-                                    </p:anim>
-                                  </p:childTnLst>
-                                </p:cTn>
-                              </p:par>
-                              <p:par>
-                                <p:cTn id="75" presetID="2" presetClass="entr" presetSubtype="4" fill="hold" grpId="0" nodeType="withEffect">
-                                  <p:stCondLst>
-                                    <p:cond delay="0"/>
-                                  </p:stCondLst>
-                                  <p:childTnLst>
-                                    <p:set>
-                                      <p:cBhvr>
-                                        <p:cTn id="76" dur="1" fill="hold">
-                                          <p:stCondLst>
-                                            <p:cond delay="0"/>
-                                          </p:stCondLst>
-                                        </p:cTn>
-                                        <p:tgtEl>
-                                          <p:spTgt spid="7"/>
-                                        </p:tgtEl>
-                                        <p:attrNameLst>
-                                          <p:attrName>style.visibility</p:attrName>
-                                        </p:attrNameLst>
-                                      </p:cBhvr>
-                                      <p:to>
-                                        <p:strVal val="visible"/>
-                                      </p:to>
-                                    </p:set>
-                                    <p:anim calcmode="lin" valueType="num">
-                                      <p:cBhvr additive="base">
-                                        <p:cTn id="77" dur="500" fill="hold"/>
                                         <p:tgtEl>
                                           <p:spTgt spid="7"/>
                                         </p:tgtEl>
@@ -18810,7 +18932,7 @@
                                     </p:anim>
                                     <p:anim calcmode="lin" valueType="num">
                                       <p:cBhvr additive="base">
-                                        <p:cTn id="78" dur="500" fill="hold"/>
+                                        <p:cTn id="74" dur="500" fill="hold"/>
                                         <p:tgtEl>
                                           <p:spTgt spid="7"/>
                                         </p:tgtEl>
@@ -18835,14 +18957,14 @@
                                 </p:cTn>
                               </p:par>
                               <p:par>
-                                <p:cTn id="79" presetID="10" presetClass="entr" presetSubtype="0" fill="hold" grpId="0" nodeType="withEffect">
+                                <p:cTn id="75" presetID="10" presetClass="entr" presetSubtype="0" fill="hold" grpId="0" nodeType="withEffect">
                                   <p:stCondLst>
                                     <p:cond delay="0"/>
                                   </p:stCondLst>
                                   <p:childTnLst>
                                     <p:set>
                                       <p:cBhvr>
-                                        <p:cTn id="80" dur="1" fill="hold">
+                                        <p:cTn id="76" dur="1" fill="hold">
                                           <p:stCondLst>
                                             <p:cond delay="0"/>
                                           </p:stCondLst>
@@ -18860,7 +18982,7 @@
                                     </p:set>
                                     <p:animEffect transition="in" filter="fade">
                                       <p:cBhvr>
-                                        <p:cTn id="81" dur="500"/>
+                                        <p:cTn id="77" dur="500"/>
                                         <p:tgtEl>
                                           <p:spTgt spid="24"/>
                                         </p:tgtEl>
@@ -18911,7 +19033,6 @@
       <p:bldP spid="16" grpId="0"/>
       <p:bldP spid="17" grpId="0" animBg="1"/>
       <p:bldP spid="18" grpId="0"/>
-      <p:bldP spid="19" grpId="0" animBg="1"/>
       <p:bldP spid="20" grpId="0" animBg="1"/>
       <p:bldP spid="21" grpId="0" animBg="1"/>
       <p:bldP spid="23" grpId="0"/>
@@ -18921,7 +19042,7 @@
 </p:sld>
 </file>
 
-<file path=ppt/slides/slide11.xml><?xml version="1.0" encoding="utf-8"?>
+<file path=ppt/slides/slide12.xml><?xml version="1.0" encoding="utf-8"?>
 <p:sld xmlns:a="http://schemas.openxmlformats.org/drawingml/2006/main" xmlns:r="http://schemas.openxmlformats.org/officeDocument/2006/relationships" xmlns:p="http://schemas.openxmlformats.org/presentationml/2006/main">
   <p:cSld>
     <p:spTree>
@@ -29265,7 +29386,7 @@
 </p:sld>
 </file>
 
-<file path=ppt/slides/slide12.xml><?xml version="1.0" encoding="utf-8"?>
+<file path=ppt/slides/slide13.xml><?xml version="1.0" encoding="utf-8"?>
 <p:sld xmlns:a="http://schemas.openxmlformats.org/drawingml/2006/main" xmlns:r="http://schemas.openxmlformats.org/officeDocument/2006/relationships" xmlns:p="http://schemas.openxmlformats.org/presentationml/2006/main">
   <p:cSld>
     <p:spTree>
@@ -29370,7 +29491,7 @@
 </p:sld>
 </file>
 
-<file path=ppt/slides/slide13.xml><?xml version="1.0" encoding="utf-8"?>
+<file path=ppt/slides/slide14.xml><?xml version="1.0" encoding="utf-8"?>
 <p:sld xmlns:a="http://schemas.openxmlformats.org/drawingml/2006/main" xmlns:r="http://schemas.openxmlformats.org/officeDocument/2006/relationships" xmlns:p="http://schemas.openxmlformats.org/presentationml/2006/main">
   <p:cSld>
     <p:spTree>
@@ -29412,7 +29533,7 @@
           <a:graphicData uri="http://schemas.openxmlformats.org/presentationml/2006/ole">
             <mc:AlternateContent xmlns:mc="http://schemas.openxmlformats.org/markup-compatibility/2006">
               <mc:Choice xmlns:v="urn:schemas-microsoft-com:vml" Requires="v">
-                <p:oleObj spid="_x0000_s58501" name="think-cell Slide" r:id="rId4" imgW="270" imgH="270" progId="TCLayout.ActiveDocument.1">
+                <p:oleObj spid="_x0000_s58509" name="think-cell Slide" r:id="rId4" imgW="270" imgH="270" progId="TCLayout.ActiveDocument.1">
                   <p:embed/>
                 </p:oleObj>
               </mc:Choice>
@@ -29521,7 +29642,7 @@
           <a:graphicData uri="http://schemas.openxmlformats.org/presentationml/2006/ole">
             <mc:AlternateContent xmlns:mc="http://schemas.openxmlformats.org/markup-compatibility/2006">
               <mc:Choice xmlns:v="urn:schemas-microsoft-com:vml" Requires="v">
-                <p:oleObj spid="_x0000_s59521" name="think-cell Slide" r:id="rId5" imgW="270" imgH="270" progId="TCLayout.ActiveDocument.1">
+                <p:oleObj spid="_x0000_s59529" name="think-cell Slide" r:id="rId5" imgW="270" imgH="270" progId="TCLayout.ActiveDocument.1">
                   <p:embed/>
                 </p:oleObj>
               </mc:Choice>
@@ -29672,137 +29793,6 @@
           <a:chExt cx="0" cy="0"/>
         </a:xfrm>
       </p:grpSpPr>
-      <p:sp>
-        <p:nvSpPr>
-          <p:cNvPr id="4" name="Title 3"/>
-          <p:cNvSpPr>
-            <a:spLocks noGrp="1"/>
-          </p:cNvSpPr>
-          <p:nvPr>
-            <p:ph type="title"/>
-          </p:nvPr>
-        </p:nvSpPr>
-        <p:spPr>
-          <a:xfrm>
-            <a:off x="519112" y="402776"/>
-            <a:ext cx="11149013" cy="747897"/>
-          </a:xfrm>
-        </p:spPr>
-        <p:txBody>
-          <a:bodyPr/>
-          <a:lstStyle/>
-          <a:p>
-            <a:r>
-              <a:rPr lang="en-US" dirty="0" smtClean="0"/>
-              <a:t>Arthur C. Clarke </a:t>
-            </a:r>
-            <a:endParaRPr lang="en-US" dirty="0"/>
-          </a:p>
-        </p:txBody>
-      </p:sp>
-      <p:sp>
-        <p:nvSpPr>
-          <p:cNvPr id="5" name="Text Placeholder 4"/>
-          <p:cNvSpPr>
-            <a:spLocks noGrp="1"/>
-          </p:cNvSpPr>
-          <p:nvPr>
-            <p:ph type="body" sz="quarter" idx="10"/>
-          </p:nvPr>
-        </p:nvSpPr>
-        <p:spPr>
-          <a:xfrm>
-            <a:off x="519112" y="1370525"/>
-            <a:ext cx="11149013" cy="443198"/>
-          </a:xfrm>
-        </p:spPr>
-        <p:txBody>
-          <a:bodyPr/>
-          <a:lstStyle/>
-          <a:p>
-            <a:r>
-              <a:rPr lang="en-US" sz="3200" dirty="0"/>
-              <a:t>Any sufficiently advanced </a:t>
-            </a:r>
-            <a:r>
-              <a:rPr lang="en-US" sz="3200" dirty="0">
-                <a:solidFill>
-                  <a:schemeClr val="accent2"/>
-                </a:solidFill>
-              </a:rPr>
-              <a:t>technology</a:t>
-            </a:r>
-            <a:r>
-              <a:rPr lang="en-US" sz="3200" dirty="0"/>
-              <a:t> is </a:t>
-            </a:r>
-            <a:r>
-              <a:rPr lang="en-US" sz="3200" dirty="0">
-                <a:solidFill>
-                  <a:schemeClr val="accent2"/>
-                </a:solidFill>
-              </a:rPr>
-              <a:t>indistinguishable</a:t>
-            </a:r>
-            <a:r>
-              <a:rPr lang="en-US" sz="3200" dirty="0"/>
-              <a:t> from </a:t>
-            </a:r>
-            <a:r>
-              <a:rPr lang="en-US" sz="3200" dirty="0">
-                <a:solidFill>
-                  <a:schemeClr val="accent2"/>
-                </a:solidFill>
-              </a:rPr>
-              <a:t>magic</a:t>
-            </a:r>
-            <a:r>
-              <a:rPr lang="en-US" sz="3200" dirty="0"/>
-              <a:t>.</a:t>
-            </a:r>
-          </a:p>
-        </p:txBody>
-      </p:sp>
-    </p:spTree>
-    <p:extLst>
-      <p:ext uri="{BB962C8B-B14F-4D97-AF65-F5344CB8AC3E}">
-        <p14:creationId xmlns:p14="http://schemas.microsoft.com/office/powerpoint/2010/main" val="1962638564"/>
-      </p:ext>
-    </p:extLst>
-  </p:cSld>
-  <p:clrMapOvr>
-    <a:masterClrMapping/>
-  </p:clrMapOvr>
-  <p:transition spd="slow">
-    <p:push dir="u"/>
-  </p:transition>
-  <p:timing>
-    <p:tnLst>
-      <p:par>
-        <p:cTn id="1" dur="indefinite" restart="never" nodeType="tmRoot"/>
-      </p:par>
-    </p:tnLst>
-  </p:timing>
-</p:sld>
-</file>
-
-<file path=ppt/slides/slide4.xml><?xml version="1.0" encoding="utf-8"?>
-<p:sld xmlns:a="http://schemas.openxmlformats.org/drawingml/2006/main" xmlns:r="http://schemas.openxmlformats.org/officeDocument/2006/relationships" xmlns:p="http://schemas.openxmlformats.org/presentationml/2006/main">
-  <p:cSld>
-    <p:spTree>
-      <p:nvGrpSpPr>
-        <p:cNvPr id="1" name=""/>
-        <p:cNvGrpSpPr/>
-        <p:nvPr/>
-      </p:nvGrpSpPr>
-      <p:grpSpPr>
-        <a:xfrm>
-          <a:off x="0" y="0"/>
-          <a:ext cx="0" cy="0"/>
-          <a:chOff x="0" y="0"/>
-          <a:chExt cx="0" cy="0"/>
-        </a:xfrm>
-      </p:grpSpPr>
       <p:graphicFrame>
         <p:nvGraphicFramePr>
           <p:cNvPr id="2" name="Object 1" hidden="1"/>
@@ -29828,7 +29818,7 @@
           <a:graphicData uri="http://schemas.openxmlformats.org/presentationml/2006/ole">
             <mc:AlternateContent xmlns:mc="http://schemas.openxmlformats.org/markup-compatibility/2006">
               <mc:Choice xmlns:v="urn:schemas-microsoft-com:vml" Requires="v">
-                <p:oleObj spid="_x0000_s23686" name="think-cell Slide" r:id="rId7" imgW="270" imgH="270" progId="TCLayout.ActiveDocument.1">
+                <p:oleObj spid="_x0000_s23694" name="think-cell Slide" r:id="rId7" imgW="270" imgH="270" progId="TCLayout.ActiveDocument.1">
                   <p:embed/>
                 </p:oleObj>
               </mc:Choice>
@@ -29982,7 +29972,7 @@
 </p:sld>
 </file>
 
-<file path=ppt/slides/slide5.xml><?xml version="1.0" encoding="utf-8"?>
+<file path=ppt/slides/slide4.xml><?xml version="1.0" encoding="utf-8"?>
 <p:sld xmlns:a="http://schemas.openxmlformats.org/drawingml/2006/main" xmlns:r="http://schemas.openxmlformats.org/officeDocument/2006/relationships" xmlns:p="http://schemas.openxmlformats.org/presentationml/2006/main">
   <p:cSld>
     <p:spTree>
@@ -30078,7 +30068,39 @@
                   <a:schemeClr val="tx1"/>
                 </a:solidFill>
               </a:rPr>
-              <a:t>An open-source series of libraries that provide an abstraction around persistent HTTP </a:t>
+              <a:t>An open-source series of libraries that provide an </a:t>
+            </a:r>
+            <a:r>
+              <a:rPr lang="en-US" dirty="0">
+                <a:solidFill>
+                  <a:schemeClr val="accent2"/>
+                </a:solidFill>
+              </a:rPr>
+              <a:t>abstraction</a:t>
+            </a:r>
+            <a:r>
+              <a:rPr lang="en-US" dirty="0">
+                <a:solidFill>
+                  <a:schemeClr val="tx1"/>
+                </a:solidFill>
+              </a:rPr>
+              <a:t> around </a:t>
+            </a:r>
+            <a:r>
+              <a:rPr lang="en-US" dirty="0">
+                <a:solidFill>
+                  <a:schemeClr val="accent2"/>
+                </a:solidFill>
+              </a:rPr>
+              <a:t>persistent HTTP</a:t>
+            </a:r>
+            <a:r>
+              <a:rPr lang="en-US" dirty="0">
+                <a:solidFill>
+                  <a:schemeClr val="tx1"/>
+                </a:solidFill>
+              </a:rPr>
+              <a:t> </a:t>
             </a:r>
             <a:r>
               <a:rPr lang="en-US" dirty="0" smtClean="0">
@@ -30871,6 +30893,137 @@
 </p:sld>
 </file>
 
+<file path=ppt/slides/slide5.xml><?xml version="1.0" encoding="utf-8"?>
+<p:sld xmlns:a="http://schemas.openxmlformats.org/drawingml/2006/main" xmlns:r="http://schemas.openxmlformats.org/officeDocument/2006/relationships" xmlns:p="http://schemas.openxmlformats.org/presentationml/2006/main">
+  <p:cSld>
+    <p:spTree>
+      <p:nvGrpSpPr>
+        <p:cNvPr id="1" name=""/>
+        <p:cNvGrpSpPr/>
+        <p:nvPr/>
+      </p:nvGrpSpPr>
+      <p:grpSpPr>
+        <a:xfrm>
+          <a:off x="0" y="0"/>
+          <a:ext cx="0" cy="0"/>
+          <a:chOff x="0" y="0"/>
+          <a:chExt cx="0" cy="0"/>
+        </a:xfrm>
+      </p:grpSpPr>
+      <p:sp>
+        <p:nvSpPr>
+          <p:cNvPr id="4" name="Title 3"/>
+          <p:cNvSpPr>
+            <a:spLocks noGrp="1"/>
+          </p:cNvSpPr>
+          <p:nvPr>
+            <p:ph type="title"/>
+          </p:nvPr>
+        </p:nvSpPr>
+        <p:spPr>
+          <a:xfrm>
+            <a:off x="519112" y="402776"/>
+            <a:ext cx="11149013" cy="747897"/>
+          </a:xfrm>
+        </p:spPr>
+        <p:txBody>
+          <a:bodyPr/>
+          <a:lstStyle/>
+          <a:p>
+            <a:r>
+              <a:rPr lang="en-US" dirty="0" smtClean="0"/>
+              <a:t>Arthur C. Clarke </a:t>
+            </a:r>
+            <a:endParaRPr lang="en-US" dirty="0"/>
+          </a:p>
+        </p:txBody>
+      </p:sp>
+      <p:sp>
+        <p:nvSpPr>
+          <p:cNvPr id="5" name="Text Placeholder 4"/>
+          <p:cNvSpPr>
+            <a:spLocks noGrp="1"/>
+          </p:cNvSpPr>
+          <p:nvPr>
+            <p:ph type="body" sz="quarter" idx="10"/>
+          </p:nvPr>
+        </p:nvSpPr>
+        <p:spPr>
+          <a:xfrm>
+            <a:off x="519112" y="1370525"/>
+            <a:ext cx="11149013" cy="443198"/>
+          </a:xfrm>
+        </p:spPr>
+        <p:txBody>
+          <a:bodyPr/>
+          <a:lstStyle/>
+          <a:p>
+            <a:r>
+              <a:rPr lang="en-US" sz="3200" dirty="0"/>
+              <a:t>Any sufficiently advanced </a:t>
+            </a:r>
+            <a:r>
+              <a:rPr lang="en-US" sz="3200" dirty="0">
+                <a:solidFill>
+                  <a:schemeClr val="accent2"/>
+                </a:solidFill>
+              </a:rPr>
+              <a:t>technology</a:t>
+            </a:r>
+            <a:r>
+              <a:rPr lang="en-US" sz="3200" dirty="0"/>
+              <a:t> is </a:t>
+            </a:r>
+            <a:r>
+              <a:rPr lang="en-US" sz="3200" dirty="0">
+                <a:solidFill>
+                  <a:schemeClr val="accent2"/>
+                </a:solidFill>
+              </a:rPr>
+              <a:t>indistinguishable</a:t>
+            </a:r>
+            <a:r>
+              <a:rPr lang="en-US" sz="3200" dirty="0"/>
+              <a:t> from </a:t>
+            </a:r>
+            <a:r>
+              <a:rPr lang="en-US" sz="3200" dirty="0">
+                <a:solidFill>
+                  <a:schemeClr val="accent2"/>
+                </a:solidFill>
+              </a:rPr>
+              <a:t>magic</a:t>
+            </a:r>
+            <a:r>
+              <a:rPr lang="en-US" sz="3200" dirty="0"/>
+              <a:t>.</a:t>
+            </a:r>
+          </a:p>
+        </p:txBody>
+      </p:sp>
+    </p:spTree>
+    <p:extLst>
+      <p:ext uri="{BB962C8B-B14F-4D97-AF65-F5344CB8AC3E}">
+        <p14:creationId xmlns:p14="http://schemas.microsoft.com/office/powerpoint/2010/main" val="1817715650"/>
+      </p:ext>
+    </p:extLst>
+  </p:cSld>
+  <p:clrMapOvr>
+    <a:masterClrMapping/>
+  </p:clrMapOvr>
+  <p:transition spd="slow">
+    <p:push dir="u"/>
+  </p:transition>
+  <p:timing>
+    <p:tnLst>
+      <p:par>
+        <p:cTn id="1" dur="indefinite" restart="never" nodeType="tmRoot"/>
+      </p:par>
+    </p:tnLst>
+  </p:timing>
+</p:sld>
+</file>
+
 <file path=ppt/slides/slide6.xml><?xml version="1.0" encoding="utf-8"?>
 <p:sld xmlns:a="http://schemas.openxmlformats.org/drawingml/2006/main" xmlns:r="http://schemas.openxmlformats.org/officeDocument/2006/relationships" xmlns:p="http://schemas.openxmlformats.org/presentationml/2006/main">
   <p:cSld>
@@ -31894,7 +32047,7 @@
                   <a:schemeClr val="tx1"/>
                 </a:solidFill>
               </a:rPr>
-              <a:t> with Polling</a:t>
+              <a:t> on Old Servers or Clients</a:t>
             </a:r>
             <a:endParaRPr lang="en-US" dirty="0">
               <a:solidFill>
@@ -33104,7 +33257,15 @@
                   <a:schemeClr val="tx1"/>
                 </a:solidFill>
               </a:rPr>
-              <a:t> with Web Sockets or SSE</a:t>
+              <a:t> </a:t>
+            </a:r>
+            <a:r>
+              <a:rPr lang="en-US" dirty="0" smtClean="0">
+                <a:solidFill>
+                  <a:schemeClr val="tx1"/>
+                </a:solidFill>
+              </a:rPr>
+              <a:t>on New Servers and Clients</a:t>
             </a:r>
             <a:endParaRPr lang="en-US" dirty="0">
               <a:solidFill>
@@ -33539,73 +33700,323 @@
       </p:grpSpPr>
       <p:sp>
         <p:nvSpPr>
-          <p:cNvPr id="13" name="Title 12"/>
-          <p:cNvSpPr>
-            <a:spLocks noGrp="1"/>
-          </p:cNvSpPr>
-          <p:nvPr>
-            <p:ph type="ctrTitle"/>
-          </p:nvPr>
+          <p:cNvPr id="4" name="Rectangle 3"/>
+          <p:cNvSpPr/>
+          <p:nvPr/>
         </p:nvSpPr>
-        <p:spPr/>
+        <p:spPr bwMode="auto">
+          <a:xfrm>
+            <a:off x="401652" y="2454822"/>
+            <a:ext cx="1811709" cy="1811709"/>
+          </a:xfrm>
+          <a:prstGeom prst="rect">
+            <a:avLst/>
+          </a:prstGeom>
+          <a:solidFill>
+            <a:schemeClr val="accent2"/>
+          </a:solidFill>
+          <a:ln>
+            <a:noFill/>
+            <a:headEnd type="none" w="med" len="med"/>
+            <a:tailEnd type="none" w="med" len="med"/>
+          </a:ln>
+          <a:effectLst/>
+        </p:spPr>
+        <p:style>
+          <a:lnRef idx="1">
+            <a:schemeClr val="accent2"/>
+          </a:lnRef>
+          <a:fillRef idx="3">
+            <a:schemeClr val="accent2"/>
+          </a:fillRef>
+          <a:effectRef idx="2">
+            <a:schemeClr val="accent2"/>
+          </a:effectRef>
+          <a:fontRef idx="minor">
+            <a:schemeClr val="lt1"/>
+          </a:fontRef>
+        </p:style>
         <p:txBody>
-          <a:bodyPr/>
+          <a:bodyPr vert="horz" wrap="square" lIns="91436" tIns="45718" rIns="91436" bIns="45718" numCol="1" rtlCol="0" anchor="ctr" anchorCtr="0" compatLnSpc="1">
+            <a:prstTxWarp prst="textNoShape">
+              <a:avLst/>
+            </a:prstTxWarp>
+          </a:bodyPr>
           <a:lstStyle/>
           <a:p>
-            <a:r>
-              <a:rPr lang="en-US" dirty="0" smtClean="0"/>
-              <a:t>Demo</a:t>
-            </a:r>
-            <a:endParaRPr lang="en-US" dirty="0"/>
+            <a:pPr algn="ctr" defTabSz="914099" fontAlgn="base">
+              <a:spcBef>
+                <a:spcPct val="0"/>
+              </a:spcBef>
+              <a:spcAft>
+                <a:spcPct val="0"/>
+              </a:spcAft>
+            </a:pPr>
+            <a:r>
+              <a:rPr lang="en-US" sz="2200" dirty="0" smtClean="0">
+                <a:gradFill>
+                  <a:gsLst>
+                    <a:gs pos="0">
+                      <a:srgbClr val="FFFFFF"/>
+                    </a:gs>
+                    <a:gs pos="100000">
+                      <a:srgbClr val="FFFFFF"/>
+                    </a:gs>
+                  </a:gsLst>
+                  <a:lin ang="5400000" scaled="0"/>
+                </a:gradFill>
+              </a:rPr>
+              <a:t>Client Browser</a:t>
+            </a:r>
           </a:p>
         </p:txBody>
       </p:sp>
       <p:sp>
         <p:nvSpPr>
-          <p:cNvPr id="2" name="Subtitle 1"/>
-          <p:cNvSpPr>
-            <a:spLocks noGrp="1"/>
-          </p:cNvSpPr>
-          <p:nvPr>
-            <p:ph type="subTitle" idx="1"/>
-          </p:nvPr>
+          <p:cNvPr id="5" name="Rectangle 4"/>
+          <p:cNvSpPr/>
+          <p:nvPr/>
         </p:nvSpPr>
-        <p:spPr/>
+        <p:spPr bwMode="auto">
+          <a:xfrm>
+            <a:off x="9954426" y="2454822"/>
+            <a:ext cx="1811709" cy="1811709"/>
+          </a:xfrm>
+          <a:prstGeom prst="rect">
+            <a:avLst/>
+          </a:prstGeom>
+          <a:solidFill>
+            <a:schemeClr val="accent2"/>
+          </a:solidFill>
+          <a:ln>
+            <a:noFill/>
+            <a:headEnd type="none" w="med" len="med"/>
+            <a:tailEnd type="none" w="med" len="med"/>
+          </a:ln>
+          <a:effectLst/>
+        </p:spPr>
+        <p:style>
+          <a:lnRef idx="1">
+            <a:schemeClr val="accent2"/>
+          </a:lnRef>
+          <a:fillRef idx="3">
+            <a:schemeClr val="accent2"/>
+          </a:fillRef>
+          <a:effectRef idx="2">
+            <a:schemeClr val="accent2"/>
+          </a:effectRef>
+          <a:fontRef idx="minor">
+            <a:schemeClr val="lt1"/>
+          </a:fontRef>
+        </p:style>
         <p:txBody>
-          <a:bodyPr/>
+          <a:bodyPr vert="horz" wrap="square" lIns="91436" tIns="45718" rIns="91436" bIns="45718" numCol="1" rtlCol="0" anchor="ctr" anchorCtr="0" compatLnSpc="1">
+            <a:prstTxWarp prst="textNoShape">
+              <a:avLst/>
+            </a:prstTxWarp>
+          </a:bodyPr>
           <a:lstStyle/>
           <a:p>
-            <a:endParaRPr lang="en-US"/>
+            <a:pPr algn="ctr" defTabSz="914099" fontAlgn="base">
+              <a:spcBef>
+                <a:spcPct val="0"/>
+              </a:spcBef>
+              <a:spcAft>
+                <a:spcPct val="0"/>
+              </a:spcAft>
+            </a:pPr>
+            <a:r>
+              <a:rPr lang="en-US" sz="2200" dirty="0" smtClean="0">
+                <a:gradFill>
+                  <a:gsLst>
+                    <a:gs pos="0">
+                      <a:srgbClr val="FFFFFF"/>
+                    </a:gs>
+                    <a:gs pos="100000">
+                      <a:srgbClr val="FFFFFF"/>
+                    </a:gs>
+                  </a:gsLst>
+                  <a:lin ang="5400000" scaled="0"/>
+                </a:gradFill>
+              </a:rPr>
+              <a:t>Web</a:t>
+            </a:r>
+            <a:br>
+              <a:rPr lang="en-US" sz="2200" dirty="0" smtClean="0">
+                <a:gradFill>
+                  <a:gsLst>
+                    <a:gs pos="0">
+                      <a:srgbClr val="FFFFFF"/>
+                    </a:gs>
+                    <a:gs pos="100000">
+                      <a:srgbClr val="FFFFFF"/>
+                    </a:gs>
+                  </a:gsLst>
+                  <a:lin ang="5400000" scaled="0"/>
+                </a:gradFill>
+              </a:rPr>
+            </a:br>
+            <a:r>
+              <a:rPr lang="en-US" sz="2200" dirty="0" smtClean="0">
+                <a:gradFill>
+                  <a:gsLst>
+                    <a:gs pos="0">
+                      <a:srgbClr val="FFFFFF"/>
+                    </a:gs>
+                    <a:gs pos="100000">
+                      <a:srgbClr val="FFFFFF"/>
+                    </a:gs>
+                  </a:gsLst>
+                  <a:lin ang="5400000" scaled="0"/>
+                </a:gradFill>
+              </a:rPr>
+              <a:t>Server</a:t>
+            </a:r>
           </a:p>
         </p:txBody>
       </p:sp>
       <p:sp>
         <p:nvSpPr>
-          <p:cNvPr id="15" name="Text Placeholder 14"/>
+          <p:cNvPr id="13" name="Title 3"/>
           <p:cNvSpPr>
             <a:spLocks noGrp="1"/>
           </p:cNvSpPr>
           <p:nvPr>
-            <p:ph type="body" sz="quarter" idx="10"/>
+            <p:ph type="title"/>
           </p:nvPr>
         </p:nvSpPr>
-        <p:spPr/>
+        <p:spPr>
+          <a:xfrm>
+            <a:off x="455622" y="402776"/>
+            <a:ext cx="11149013" cy="747897"/>
+          </a:xfrm>
+        </p:spPr>
         <p:txBody>
           <a:bodyPr/>
           <a:lstStyle/>
           <a:p>
             <a:r>
-              <a:rPr lang="en-US" dirty="0" smtClean="0"/>
-              <a:t>Online Gaming</a:t>
-            </a:r>
-            <a:endParaRPr lang="en-US" dirty="0"/>
+              <a:rPr lang="en-US" dirty="0" smtClean="0">
+                <a:solidFill>
+                  <a:schemeClr val="tx1"/>
+                </a:solidFill>
+              </a:rPr>
+              <a:t>Basically…</a:t>
+            </a:r>
+            <a:endParaRPr lang="en-US" dirty="0">
+              <a:solidFill>
+                <a:schemeClr val="tx1"/>
+              </a:solidFill>
+            </a:endParaRPr>
+          </a:p>
+        </p:txBody>
+      </p:sp>
+      <p:sp>
+        <p:nvSpPr>
+          <p:cNvPr id="2" name="Left-Right Arrow 1"/>
+          <p:cNvSpPr/>
+          <p:nvPr/>
+        </p:nvSpPr>
+        <p:spPr bwMode="auto">
+          <a:xfrm>
+            <a:off x="3170662" y="2454822"/>
+            <a:ext cx="6084677" cy="1811709"/>
+          </a:xfrm>
+          <a:prstGeom prst="leftRightArrow">
+            <a:avLst/>
+          </a:prstGeom>
+          <a:solidFill>
+            <a:schemeClr val="accent6"/>
+          </a:solidFill>
+          <a:ln>
+            <a:noFill/>
+            <a:headEnd type="none" w="med" len="med"/>
+            <a:tailEnd type="none" w="med" len="med"/>
+          </a:ln>
+          <a:effectLst/>
+        </p:spPr>
+        <p:style>
+          <a:lnRef idx="1">
+            <a:schemeClr val="accent2"/>
+          </a:lnRef>
+          <a:fillRef idx="3">
+            <a:schemeClr val="accent2"/>
+          </a:fillRef>
+          <a:effectRef idx="2">
+            <a:schemeClr val="accent2"/>
+          </a:effectRef>
+          <a:fontRef idx="minor">
+            <a:schemeClr val="lt1"/>
+          </a:fontRef>
+        </p:style>
+        <p:txBody>
+          <a:bodyPr vert="horz" wrap="square" lIns="91436" tIns="45718" rIns="91436" bIns="45718" numCol="1" rtlCol="0" anchor="ctr" anchorCtr="0" compatLnSpc="1">
+            <a:prstTxWarp prst="textNoShape">
+              <a:avLst/>
+            </a:prstTxWarp>
+          </a:bodyPr>
+          <a:lstStyle/>
+          <a:p>
+            <a:pPr algn="ctr" defTabSz="914099" fontAlgn="base">
+              <a:spcBef>
+                <a:spcPct val="0"/>
+              </a:spcBef>
+              <a:spcAft>
+                <a:spcPct val="0"/>
+              </a:spcAft>
+            </a:pPr>
+            <a:r>
+              <a:rPr lang="en-US" sz="4400" dirty="0" err="1" smtClean="0">
+                <a:gradFill>
+                  <a:gsLst>
+                    <a:gs pos="0">
+                      <a:srgbClr val="FFFFFF"/>
+                    </a:gs>
+                    <a:gs pos="100000">
+                      <a:srgbClr val="FFFFFF"/>
+                    </a:gs>
+                  </a:gsLst>
+                  <a:lin ang="5400000" scaled="0"/>
+                </a:gradFill>
+              </a:rPr>
+              <a:t>SignalR</a:t>
+            </a:r>
+            <a:r>
+              <a:rPr lang="en-US" sz="4400" dirty="0" smtClean="0">
+                <a:gradFill>
+                  <a:gsLst>
+                    <a:gs pos="0">
+                      <a:srgbClr val="FFFFFF"/>
+                    </a:gs>
+                    <a:gs pos="100000">
+                      <a:srgbClr val="FFFFFF"/>
+                    </a:gs>
+                  </a:gsLst>
+                  <a:lin ang="5400000" scaled="0"/>
+                </a:gradFill>
+              </a:rPr>
+              <a:t>!!!</a:t>
+            </a:r>
+            <a:endParaRPr lang="en-US" sz="4400" dirty="0" smtClean="0">
+              <a:gradFill>
+                <a:gsLst>
+                  <a:gs pos="0">
+                    <a:srgbClr val="FFFFFF"/>
+                  </a:gs>
+                  <a:gs pos="100000">
+                    <a:srgbClr val="FFFFFF"/>
+                  </a:gs>
+                </a:gsLst>
+                <a:lin ang="5400000" scaled="0"/>
+              </a:gradFill>
+            </a:endParaRPr>
           </a:p>
         </p:txBody>
       </p:sp>
     </p:spTree>
     <p:extLst>
       <p:ext uri="{BB962C8B-B14F-4D97-AF65-F5344CB8AC3E}">
-        <p14:creationId xmlns:p14="http://schemas.microsoft.com/office/powerpoint/2010/main" val="3624967951"/>
+        <p14:creationId xmlns:p14="http://schemas.microsoft.com/office/powerpoint/2010/main" val="2651191158"/>
       </p:ext>
     </p:extLst>
   </p:cSld>
@@ -33618,9 +34029,135 @@
   <p:timing>
     <p:tnLst>
       <p:par>
-        <p:cTn id="1" dur="indefinite" restart="never" nodeType="tmRoot"/>
+        <p:cTn id="1" dur="indefinite" restart="never" nodeType="tmRoot">
+          <p:childTnLst>
+            <p:seq concurrent="1" nextAc="seek">
+              <p:cTn id="2" dur="indefinite" nodeType="mainSeq">
+                <p:childTnLst>
+                  <p:par>
+                    <p:cTn id="3" fill="hold">
+                      <p:stCondLst>
+                        <p:cond delay="indefinite"/>
+                      </p:stCondLst>
+                      <p:childTnLst>
+                        <p:par>
+                          <p:cTn id="4" fill="hold">
+                            <p:stCondLst>
+                              <p:cond delay="0"/>
+                            </p:stCondLst>
+                            <p:childTnLst>
+                              <p:par>
+                                <p:cTn id="5" presetID="13" presetClass="entr" presetSubtype="32" fill="hold" grpId="0" nodeType="clickEffect">
+                                  <p:stCondLst>
+                                    <p:cond delay="0"/>
+                                  </p:stCondLst>
+                                  <p:childTnLst>
+                                    <p:set>
+                                      <p:cBhvr>
+                                        <p:cTn id="6" dur="1" fill="hold">
+                                          <p:stCondLst>
+                                            <p:cond delay="0"/>
+                                          </p:stCondLst>
+                                        </p:cTn>
+                                        <p:tgtEl>
+                                          <p:spTgt spid="2">
+                                            <p:bg/>
+                                          </p:spTgt>
+                                        </p:tgtEl>
+                                        <p:attrNameLst>
+                                          <p:attrName>style.visibility</p:attrName>
+                                        </p:attrNameLst>
+                                      </p:cBhvr>
+                                      <p:to>
+                                        <p:strVal val="visible"/>
+                                      </p:to>
+                                    </p:set>
+                                    <p:animEffect transition="in" filter="plus(out)">
+                                      <p:cBhvr>
+                                        <p:cTn id="7" dur="500"/>
+                                        <p:tgtEl>
+                                          <p:spTgt spid="2">
+                                            <p:bg/>
+                                          </p:spTgt>
+                                        </p:tgtEl>
+                                      </p:cBhvr>
+                                    </p:animEffect>
+                                  </p:childTnLst>
+                                </p:cTn>
+                              </p:par>
+                              <p:par>
+                                <p:cTn id="8" presetID="13" presetClass="entr" presetSubtype="32" fill="hold" grpId="0" nodeType="withEffect">
+                                  <p:stCondLst>
+                                    <p:cond delay="0"/>
+                                  </p:stCondLst>
+                                  <p:childTnLst>
+                                    <p:set>
+                                      <p:cBhvr>
+                                        <p:cTn id="9" dur="1" fill="hold">
+                                          <p:stCondLst>
+                                            <p:cond delay="0"/>
+                                          </p:stCondLst>
+                                        </p:cTn>
+                                        <p:tgtEl>
+                                          <p:spTgt spid="2">
+                                            <p:txEl>
+                                              <p:pRg st="0" end="0"/>
+                                            </p:txEl>
+                                          </p:spTgt>
+                                        </p:tgtEl>
+                                        <p:attrNameLst>
+                                          <p:attrName>style.visibility</p:attrName>
+                                        </p:attrNameLst>
+                                      </p:cBhvr>
+                                      <p:to>
+                                        <p:strVal val="visible"/>
+                                      </p:to>
+                                    </p:set>
+                                    <p:animEffect transition="in" filter="plus(out)">
+                                      <p:cBhvr>
+                                        <p:cTn id="10" dur="500"/>
+                                        <p:tgtEl>
+                                          <p:spTgt spid="2">
+                                            <p:txEl>
+                                              <p:pRg st="0" end="0"/>
+                                            </p:txEl>
+                                          </p:spTgt>
+                                        </p:tgtEl>
+                                      </p:cBhvr>
+                                    </p:animEffect>
+                                  </p:childTnLst>
+                                </p:cTn>
+                              </p:par>
+                            </p:childTnLst>
+                          </p:cTn>
+                        </p:par>
+                      </p:childTnLst>
+                    </p:cTn>
+                  </p:par>
+                </p:childTnLst>
+              </p:cTn>
+              <p:prevCondLst>
+                <p:cond evt="onPrev" delay="0">
+                  <p:tgtEl>
+                    <p:sldTgt/>
+                  </p:tgtEl>
+                </p:cond>
+              </p:prevCondLst>
+              <p:nextCondLst>
+                <p:cond evt="onNext" delay="0">
+                  <p:tgtEl>
+                    <p:sldTgt/>
+                  </p:tgtEl>
+                </p:cond>
+              </p:nextCondLst>
+            </p:seq>
+          </p:childTnLst>
+        </p:cTn>
       </p:par>
     </p:tnLst>
+    <p:bldLst>
+      <p:bldP spid="2" grpId="0" build="allAtOnce" animBg="1"/>
+    </p:bldLst>
   </p:timing>
 </p:sld>
 </file>
@@ -34867,6 +35404,17 @@
 </file>
 
 <file path=customXml/item1.xml><?xml version="1.0" encoding="utf-8"?>
+<p:properties xmlns:p="http://schemas.microsoft.com/office/2006/metadata/properties" xmlns:xsi="http://www.w3.org/2001/XMLSchema-instance" xmlns:pc="http://schemas.microsoft.com/office/infopath/2007/PartnerControls">
+  <documentManagement>
+    <TaxKeywordTaxHTField xmlns="230e9df3-be65-4c73-a93b-d1236ebd677e">
+      <Terms xmlns="http://schemas.microsoft.com/office/infopath/2007/PartnerControls"/>
+    </TaxKeywordTaxHTField>
+    <TaxCatchAll xmlns="230e9df3-be65-4c73-a93b-d1236ebd677e"/>
+  </documentManagement>
+</p:properties>
+</file>
+
+<file path=customXml/item2.xml><?xml version="1.0" encoding="utf-8"?>
 <ct:contentTypeSchema xmlns:ct="http://schemas.microsoft.com/office/2006/metadata/contentType" xmlns:ma="http://schemas.microsoft.com/office/2006/metadata/properties/metaAttributes" ct:_="" ma:_="" ma:contentTypeName="Document" ma:contentTypeID="0x010100CA05B43BE68FE54B90DD26FDFB72BB05" ma:contentTypeVersion="0" ma:contentTypeDescription="Create a new document." ma:contentTypeScope="" ma:versionID="6df1bece345c1749bd9b91e82fa4a03a">
   <xsd:schema xmlns:xsd="http://www.w3.org/2001/XMLSchema" xmlns:xs="http://www.w3.org/2001/XMLSchema" xmlns:p="http://schemas.microsoft.com/office/2006/metadata/properties" xmlns:ns2="230e9df3-be65-4c73-a93b-d1236ebd677e" targetNamespace="http://schemas.microsoft.com/office/2006/metadata/properties" ma:root="true" ma:fieldsID="e317b0b832c9845d3aae3abd1bb0954e" ns2:_="">
     <xsd:import namespace="230e9df3-be65-4c73-a93b-d1236ebd677e"/>
@@ -35018,17 +35566,6 @@
 </ct:contentTypeSchema>
 </file>
 
-<file path=customXml/item2.xml><?xml version="1.0" encoding="utf-8"?>
-<p:properties xmlns:p="http://schemas.microsoft.com/office/2006/metadata/properties" xmlns:xsi="http://www.w3.org/2001/XMLSchema-instance" xmlns:pc="http://schemas.microsoft.com/office/infopath/2007/PartnerControls">
-  <documentManagement>
-    <TaxKeywordTaxHTField xmlns="230e9df3-be65-4c73-a93b-d1236ebd677e">
-      <Terms xmlns="http://schemas.microsoft.com/office/infopath/2007/PartnerControls"/>
-    </TaxKeywordTaxHTField>
-    <TaxCatchAll xmlns="230e9df3-be65-4c73-a93b-d1236ebd677e"/>
-  </documentManagement>
-</p:properties>
-</file>
-
 <file path=customXml/item3.xml><?xml version="1.0" encoding="utf-8"?>
 <?mso-contentType ?>
 <FormTemplates xmlns="http://schemas.microsoft.com/sharepoint/v3/contenttype/forms">
@@ -35039,6 +35576,22 @@
 </file>
 
 <file path=customXml/itemProps1.xml><?xml version="1.0" encoding="utf-8"?>
+<ds:datastoreItem xmlns:ds="http://schemas.openxmlformats.org/officeDocument/2006/customXml" ds:itemID="{69B2F97D-0457-4986-9734-D03EB073C5EA}">
+  <ds:schemaRefs>
+    <ds:schemaRef ds:uri="http://schemas.microsoft.com/office/infopath/2007/PartnerControls"/>
+    <ds:schemaRef ds:uri="http://purl.org/dc/terms/"/>
+    <ds:schemaRef ds:uri="http://schemas.microsoft.com/office/2006/documentManagement/types"/>
+    <ds:schemaRef ds:uri="http://purl.org/dc/elements/1.1/"/>
+    <ds:schemaRef ds:uri="http://schemas.openxmlformats.org/package/2006/metadata/core-properties"/>
+    <ds:schemaRef ds:uri="230e9df3-be65-4c73-a93b-d1236ebd677e"/>
+    <ds:schemaRef ds:uri="http://schemas.microsoft.com/office/2006/metadata/properties"/>
+    <ds:schemaRef ds:uri="http://www.w3.org/XML/1998/namespace"/>
+    <ds:schemaRef ds:uri="http://purl.org/dc/dcmitype/"/>
+  </ds:schemaRefs>
+</ds:datastoreItem>
+</file>
+
+<file path=customXml/itemProps2.xml><?xml version="1.0" encoding="utf-8"?>
 <ds:datastoreItem xmlns:ds="http://schemas.openxmlformats.org/officeDocument/2006/customXml" ds:itemID="{8F590144-748D-417B-8B69-088F107B0F98}">
   <ds:schemaRefs>
     <ds:schemaRef ds:uri="http://schemas.microsoft.com/office/2006/metadata/contentType"/>
@@ -35056,22 +35609,6 @@
 </ds:datastoreItem>
 </file>
 
-<file path=customXml/itemProps2.xml><?xml version="1.0" encoding="utf-8"?>
-<ds:datastoreItem xmlns:ds="http://schemas.openxmlformats.org/officeDocument/2006/customXml" ds:itemID="{69B2F97D-0457-4986-9734-D03EB073C5EA}">
-  <ds:schemaRefs>
-    <ds:schemaRef ds:uri="http://schemas.microsoft.com/office/infopath/2007/PartnerControls"/>
-    <ds:schemaRef ds:uri="http://purl.org/dc/terms/"/>
-    <ds:schemaRef ds:uri="http://schemas.microsoft.com/office/2006/documentManagement/types"/>
-    <ds:schemaRef ds:uri="http://purl.org/dc/elements/1.1/"/>
-    <ds:schemaRef ds:uri="http://schemas.openxmlformats.org/package/2006/metadata/core-properties"/>
-    <ds:schemaRef ds:uri="230e9df3-be65-4c73-a93b-d1236ebd677e"/>
-    <ds:schemaRef ds:uri="http://schemas.microsoft.com/office/2006/metadata/properties"/>
-    <ds:schemaRef ds:uri="http://www.w3.org/XML/1998/namespace"/>
-    <ds:schemaRef ds:uri="http://purl.org/dc/dcmitype/"/>
-  </ds:schemaRefs>
-</ds:datastoreItem>
-</file>
-
 <file path=customXml/itemProps3.xml><?xml version="1.0" encoding="utf-8"?>
 <ds:datastoreItem xmlns:ds="http://schemas.openxmlformats.org/officeDocument/2006/customXml" ds:itemID="{B882D8D6-9D38-4159-A398-AAC3689D3D7C}">
   <ds:schemaRefs>

</xml_diff>